<commit_message>
mejorado modelo canvas EIE
</commit_message>
<xml_diff>
--- a/empresa/Business_Model_Canvas_Template.pptx
+++ b/empresa/Business_Model_Canvas_Template.pptx
@@ -54,7 +54,7 @@
       </p:grpSpPr>
       <p:sp>
         <p:nvSpPr>
-          <p:cNvPr id="26" name="PlaceHolder 1"/>
+          <p:cNvPr id="23" name="PlaceHolder 1"/>
           <p:cNvSpPr>
             <a:spLocks noGrp="1"/>
           </p:cNvSpPr>
@@ -64,8 +64,8 @@
         </p:nvSpPr>
         <p:spPr>
           <a:xfrm>
-            <a:off x="457200" y="274680"/>
-            <a:ext cx="8229240" cy="1142640"/>
+            <a:off x="457200" y="273600"/>
+            <a:ext cx="8229240" cy="1144800"/>
           </a:xfrm>
           <a:prstGeom prst="rect">
             <a:avLst/>
@@ -74,10 +74,8 @@
         <p:txBody>
           <a:bodyPr lIns="0" rIns="0" tIns="0" bIns="0" anchor="ctr"/>
           <a:p>
-            <a:endParaRPr b="0" lang="en-US" sz="4400" spc="-1" strike="noStrike">
-              <a:solidFill>
-                <a:srgbClr val="000000"/>
-              </a:solidFill>
+            <a:pPr algn="ctr"/>
+            <a:endParaRPr b="0" lang="es-ES" sz="4400" spc="-1" strike="noStrike">
               <a:latin typeface="Arial"/>
             </a:endParaRPr>
           </a:p>
@@ -85,7 +83,7 @@
       </p:sp>
       <p:sp>
         <p:nvSpPr>
-          <p:cNvPr id="27" name="PlaceHolder 2"/>
+          <p:cNvPr id="24" name="PlaceHolder 2"/>
           <p:cNvSpPr>
             <a:spLocks noGrp="1"/>
           </p:cNvSpPr>
@@ -95,8 +93,8 @@
         </p:nvSpPr>
         <p:spPr>
           <a:xfrm>
-            <a:off x="457200" y="1600200"/>
-            <a:ext cx="8229240" cy="2158560"/>
+            <a:off x="457200" y="1604520"/>
+            <a:ext cx="8229240" cy="1896840"/>
           </a:xfrm>
           <a:prstGeom prst="rect">
             <a:avLst/>
@@ -107,18 +105,15 @@
             <a:normAutofit/>
           </a:bodyPr>
           <a:p>
-            <a:endParaRPr b="0" lang="en-US" sz="3200" spc="-1" strike="noStrike">
-              <a:solidFill>
-                <a:srgbClr val="000000"/>
-              </a:solidFill>
-              <a:latin typeface="Calibri"/>
+            <a:endParaRPr b="0" lang="es-ES" sz="3200" spc="-1" strike="noStrike">
+              <a:latin typeface="Arial"/>
             </a:endParaRPr>
           </a:p>
         </p:txBody>
       </p:sp>
       <p:sp>
         <p:nvSpPr>
-          <p:cNvPr id="28" name="PlaceHolder 3"/>
+          <p:cNvPr id="25" name="PlaceHolder 3"/>
           <p:cNvSpPr>
             <a:spLocks noGrp="1"/>
           </p:cNvSpPr>
@@ -128,8 +123,8 @@
         </p:nvSpPr>
         <p:spPr>
           <a:xfrm>
-            <a:off x="457200" y="3964320"/>
-            <a:ext cx="8229240" cy="2158560"/>
+            <a:off x="457200" y="3682080"/>
+            <a:ext cx="8229240" cy="1896840"/>
           </a:xfrm>
           <a:prstGeom prst="rect">
             <a:avLst/>
@@ -140,11 +135,8 @@
             <a:normAutofit/>
           </a:bodyPr>
           <a:p>
-            <a:endParaRPr b="0" lang="en-US" sz="3200" spc="-1" strike="noStrike">
-              <a:solidFill>
-                <a:srgbClr val="000000"/>
-              </a:solidFill>
-              <a:latin typeface="Calibri"/>
+            <a:endParaRPr b="0" lang="es-ES" sz="3200" spc="-1" strike="noStrike">
+              <a:latin typeface="Arial"/>
             </a:endParaRPr>
           </a:p>
         </p:txBody>
@@ -173,7 +165,7 @@
       </p:grpSpPr>
       <p:sp>
         <p:nvSpPr>
-          <p:cNvPr id="29" name="PlaceHolder 1"/>
+          <p:cNvPr id="26" name="PlaceHolder 1"/>
           <p:cNvSpPr>
             <a:spLocks noGrp="1"/>
           </p:cNvSpPr>
@@ -183,8 +175,8 @@
         </p:nvSpPr>
         <p:spPr>
           <a:xfrm>
-            <a:off x="457200" y="274680"/>
-            <a:ext cx="8229240" cy="1142640"/>
+            <a:off x="457200" y="273600"/>
+            <a:ext cx="8229240" cy="1144800"/>
           </a:xfrm>
           <a:prstGeom prst="rect">
             <a:avLst/>
@@ -193,10 +185,8 @@
         <p:txBody>
           <a:bodyPr lIns="0" rIns="0" tIns="0" bIns="0" anchor="ctr"/>
           <a:p>
-            <a:endParaRPr b="0" lang="en-US" sz="4400" spc="-1" strike="noStrike">
-              <a:solidFill>
-                <a:srgbClr val="000000"/>
-              </a:solidFill>
+            <a:pPr algn="ctr"/>
+            <a:endParaRPr b="0" lang="es-ES" sz="4400" spc="-1" strike="noStrike">
               <a:latin typeface="Arial"/>
             </a:endParaRPr>
           </a:p>
@@ -204,7 +194,7 @@
       </p:sp>
       <p:sp>
         <p:nvSpPr>
-          <p:cNvPr id="30" name="PlaceHolder 2"/>
+          <p:cNvPr id="27" name="PlaceHolder 2"/>
           <p:cNvSpPr>
             <a:spLocks noGrp="1"/>
           </p:cNvSpPr>
@@ -214,8 +204,8 @@
         </p:nvSpPr>
         <p:spPr>
           <a:xfrm>
-            <a:off x="457200" y="1600200"/>
-            <a:ext cx="4015800" cy="2158560"/>
+            <a:off x="457200" y="1604520"/>
+            <a:ext cx="4015800" cy="1896840"/>
           </a:xfrm>
           <a:prstGeom prst="rect">
             <a:avLst/>
@@ -226,18 +216,15 @@
             <a:normAutofit/>
           </a:bodyPr>
           <a:p>
-            <a:endParaRPr b="0" lang="en-US" sz="3200" spc="-1" strike="noStrike">
-              <a:solidFill>
-                <a:srgbClr val="000000"/>
-              </a:solidFill>
-              <a:latin typeface="Calibri"/>
+            <a:endParaRPr b="0" lang="es-ES" sz="3200" spc="-1" strike="noStrike">
+              <a:latin typeface="Arial"/>
             </a:endParaRPr>
           </a:p>
         </p:txBody>
       </p:sp>
       <p:sp>
         <p:nvSpPr>
-          <p:cNvPr id="31" name="PlaceHolder 3"/>
+          <p:cNvPr id="28" name="PlaceHolder 3"/>
           <p:cNvSpPr>
             <a:spLocks noGrp="1"/>
           </p:cNvSpPr>
@@ -247,8 +234,8 @@
         </p:nvSpPr>
         <p:spPr>
           <a:xfrm>
-            <a:off x="4674240" y="1600200"/>
-            <a:ext cx="4015800" cy="2158560"/>
+            <a:off x="4674240" y="1604520"/>
+            <a:ext cx="4015800" cy="1896840"/>
           </a:xfrm>
           <a:prstGeom prst="rect">
             <a:avLst/>
@@ -259,18 +246,15 @@
             <a:normAutofit/>
           </a:bodyPr>
           <a:p>
-            <a:endParaRPr b="0" lang="en-US" sz="3200" spc="-1" strike="noStrike">
-              <a:solidFill>
-                <a:srgbClr val="000000"/>
-              </a:solidFill>
-              <a:latin typeface="Calibri"/>
+            <a:endParaRPr b="0" lang="es-ES" sz="3200" spc="-1" strike="noStrike">
+              <a:latin typeface="Arial"/>
             </a:endParaRPr>
           </a:p>
         </p:txBody>
       </p:sp>
       <p:sp>
         <p:nvSpPr>
-          <p:cNvPr id="32" name="PlaceHolder 4"/>
+          <p:cNvPr id="29" name="PlaceHolder 4"/>
           <p:cNvSpPr>
             <a:spLocks noGrp="1"/>
           </p:cNvSpPr>
@@ -280,8 +264,8 @@
         </p:nvSpPr>
         <p:spPr>
           <a:xfrm>
-            <a:off x="457200" y="3964320"/>
-            <a:ext cx="4015800" cy="2158560"/>
+            <a:off x="457200" y="3682080"/>
+            <a:ext cx="4015800" cy="1896840"/>
           </a:xfrm>
           <a:prstGeom prst="rect">
             <a:avLst/>
@@ -292,18 +276,15 @@
             <a:normAutofit/>
           </a:bodyPr>
           <a:p>
-            <a:endParaRPr b="0" lang="en-US" sz="3200" spc="-1" strike="noStrike">
-              <a:solidFill>
-                <a:srgbClr val="000000"/>
-              </a:solidFill>
-              <a:latin typeface="Calibri"/>
+            <a:endParaRPr b="0" lang="es-ES" sz="3200" spc="-1" strike="noStrike">
+              <a:latin typeface="Arial"/>
             </a:endParaRPr>
           </a:p>
         </p:txBody>
       </p:sp>
       <p:sp>
         <p:nvSpPr>
-          <p:cNvPr id="33" name="PlaceHolder 5"/>
+          <p:cNvPr id="30" name="PlaceHolder 5"/>
           <p:cNvSpPr>
             <a:spLocks noGrp="1"/>
           </p:cNvSpPr>
@@ -313,8 +294,8 @@
         </p:nvSpPr>
         <p:spPr>
           <a:xfrm>
-            <a:off x="4674240" y="3964320"/>
-            <a:ext cx="4015800" cy="2158560"/>
+            <a:off x="4674240" y="3682080"/>
+            <a:ext cx="4015800" cy="1896840"/>
           </a:xfrm>
           <a:prstGeom prst="rect">
             <a:avLst/>
@@ -325,11 +306,8 @@
             <a:normAutofit/>
           </a:bodyPr>
           <a:p>
-            <a:endParaRPr b="0" lang="en-US" sz="3200" spc="-1" strike="noStrike">
-              <a:solidFill>
-                <a:srgbClr val="000000"/>
-              </a:solidFill>
-              <a:latin typeface="Calibri"/>
+            <a:endParaRPr b="0" lang="es-ES" sz="3200" spc="-1" strike="noStrike">
+              <a:latin typeface="Arial"/>
             </a:endParaRPr>
           </a:p>
         </p:txBody>
@@ -358,7 +336,7 @@
       </p:grpSpPr>
       <p:sp>
         <p:nvSpPr>
-          <p:cNvPr id="34" name="PlaceHolder 1"/>
+          <p:cNvPr id="31" name="PlaceHolder 1"/>
           <p:cNvSpPr>
             <a:spLocks noGrp="1"/>
           </p:cNvSpPr>
@@ -368,8 +346,8 @@
         </p:nvSpPr>
         <p:spPr>
           <a:xfrm>
-            <a:off x="457200" y="274680"/>
-            <a:ext cx="8229240" cy="1142640"/>
+            <a:off x="457200" y="273600"/>
+            <a:ext cx="8229240" cy="1144800"/>
           </a:xfrm>
           <a:prstGeom prst="rect">
             <a:avLst/>
@@ -378,10 +356,8 @@
         <p:txBody>
           <a:bodyPr lIns="0" rIns="0" tIns="0" bIns="0" anchor="ctr"/>
           <a:p>
-            <a:endParaRPr b="0" lang="en-US" sz="4400" spc="-1" strike="noStrike">
-              <a:solidFill>
-                <a:srgbClr val="000000"/>
-              </a:solidFill>
+            <a:pPr algn="ctr"/>
+            <a:endParaRPr b="0" lang="es-ES" sz="4400" spc="-1" strike="noStrike">
               <a:latin typeface="Arial"/>
             </a:endParaRPr>
           </a:p>
@@ -389,7 +365,7 @@
       </p:sp>
       <p:sp>
         <p:nvSpPr>
-          <p:cNvPr id="35" name="PlaceHolder 2"/>
+          <p:cNvPr id="32" name="PlaceHolder 2"/>
           <p:cNvSpPr>
             <a:spLocks noGrp="1"/>
           </p:cNvSpPr>
@@ -399,8 +375,8 @@
         </p:nvSpPr>
         <p:spPr>
           <a:xfrm>
-            <a:off x="457200" y="1600200"/>
-            <a:ext cx="2649600" cy="2158560"/>
+            <a:off x="457200" y="1604520"/>
+            <a:ext cx="2649600" cy="1896840"/>
           </a:xfrm>
           <a:prstGeom prst="rect">
             <a:avLst/>
@@ -411,18 +387,15 @@
             <a:normAutofit/>
           </a:bodyPr>
           <a:p>
-            <a:endParaRPr b="0" lang="en-US" sz="3200" spc="-1" strike="noStrike">
-              <a:solidFill>
-                <a:srgbClr val="000000"/>
-              </a:solidFill>
-              <a:latin typeface="Calibri"/>
+            <a:endParaRPr b="0" lang="es-ES" sz="3200" spc="-1" strike="noStrike">
+              <a:latin typeface="Arial"/>
             </a:endParaRPr>
           </a:p>
         </p:txBody>
       </p:sp>
       <p:sp>
         <p:nvSpPr>
-          <p:cNvPr id="36" name="PlaceHolder 3"/>
+          <p:cNvPr id="33" name="PlaceHolder 3"/>
           <p:cNvSpPr>
             <a:spLocks noGrp="1"/>
           </p:cNvSpPr>
@@ -432,8 +405,8 @@
         </p:nvSpPr>
         <p:spPr>
           <a:xfrm>
-            <a:off x="3239640" y="1600200"/>
-            <a:ext cx="2649600" cy="2158560"/>
+            <a:off x="3239640" y="1604520"/>
+            <a:ext cx="2649600" cy="1896840"/>
           </a:xfrm>
           <a:prstGeom prst="rect">
             <a:avLst/>
@@ -444,18 +417,15 @@
             <a:normAutofit/>
           </a:bodyPr>
           <a:p>
-            <a:endParaRPr b="0" lang="en-US" sz="3200" spc="-1" strike="noStrike">
-              <a:solidFill>
-                <a:srgbClr val="000000"/>
-              </a:solidFill>
-              <a:latin typeface="Calibri"/>
+            <a:endParaRPr b="0" lang="es-ES" sz="3200" spc="-1" strike="noStrike">
+              <a:latin typeface="Arial"/>
             </a:endParaRPr>
           </a:p>
         </p:txBody>
       </p:sp>
       <p:sp>
         <p:nvSpPr>
-          <p:cNvPr id="37" name="PlaceHolder 4"/>
+          <p:cNvPr id="34" name="PlaceHolder 4"/>
           <p:cNvSpPr>
             <a:spLocks noGrp="1"/>
           </p:cNvSpPr>
@@ -465,8 +435,8 @@
         </p:nvSpPr>
         <p:spPr>
           <a:xfrm>
-            <a:off x="6022080" y="1600200"/>
-            <a:ext cx="2649600" cy="2158560"/>
+            <a:off x="6022080" y="1604520"/>
+            <a:ext cx="2649600" cy="1896840"/>
           </a:xfrm>
           <a:prstGeom prst="rect">
             <a:avLst/>
@@ -477,18 +447,15 @@
             <a:normAutofit/>
           </a:bodyPr>
           <a:p>
-            <a:endParaRPr b="0" lang="en-US" sz="3200" spc="-1" strike="noStrike">
-              <a:solidFill>
-                <a:srgbClr val="000000"/>
-              </a:solidFill>
-              <a:latin typeface="Calibri"/>
+            <a:endParaRPr b="0" lang="es-ES" sz="3200" spc="-1" strike="noStrike">
+              <a:latin typeface="Arial"/>
             </a:endParaRPr>
           </a:p>
         </p:txBody>
       </p:sp>
       <p:sp>
         <p:nvSpPr>
-          <p:cNvPr id="38" name="PlaceHolder 5"/>
+          <p:cNvPr id="35" name="PlaceHolder 5"/>
           <p:cNvSpPr>
             <a:spLocks noGrp="1"/>
           </p:cNvSpPr>
@@ -498,8 +465,8 @@
         </p:nvSpPr>
         <p:spPr>
           <a:xfrm>
-            <a:off x="457200" y="3964320"/>
-            <a:ext cx="2649600" cy="2158560"/>
+            <a:off x="457200" y="3682080"/>
+            <a:ext cx="2649600" cy="1896840"/>
           </a:xfrm>
           <a:prstGeom prst="rect">
             <a:avLst/>
@@ -510,18 +477,15 @@
             <a:normAutofit/>
           </a:bodyPr>
           <a:p>
-            <a:endParaRPr b="0" lang="en-US" sz="3200" spc="-1" strike="noStrike">
-              <a:solidFill>
-                <a:srgbClr val="000000"/>
-              </a:solidFill>
-              <a:latin typeface="Calibri"/>
+            <a:endParaRPr b="0" lang="es-ES" sz="3200" spc="-1" strike="noStrike">
+              <a:latin typeface="Arial"/>
             </a:endParaRPr>
           </a:p>
         </p:txBody>
       </p:sp>
       <p:sp>
         <p:nvSpPr>
-          <p:cNvPr id="39" name="PlaceHolder 6"/>
+          <p:cNvPr id="36" name="PlaceHolder 6"/>
           <p:cNvSpPr>
             <a:spLocks noGrp="1"/>
           </p:cNvSpPr>
@@ -531,8 +495,8 @@
         </p:nvSpPr>
         <p:spPr>
           <a:xfrm>
-            <a:off x="3239640" y="3964320"/>
-            <a:ext cx="2649600" cy="2158560"/>
+            <a:off x="3239640" y="3682080"/>
+            <a:ext cx="2649600" cy="1896840"/>
           </a:xfrm>
           <a:prstGeom prst="rect">
             <a:avLst/>
@@ -543,18 +507,15 @@
             <a:normAutofit/>
           </a:bodyPr>
           <a:p>
-            <a:endParaRPr b="0" lang="en-US" sz="3200" spc="-1" strike="noStrike">
-              <a:solidFill>
-                <a:srgbClr val="000000"/>
-              </a:solidFill>
-              <a:latin typeface="Calibri"/>
+            <a:endParaRPr b="0" lang="es-ES" sz="3200" spc="-1" strike="noStrike">
+              <a:latin typeface="Arial"/>
             </a:endParaRPr>
           </a:p>
         </p:txBody>
       </p:sp>
       <p:sp>
         <p:nvSpPr>
-          <p:cNvPr id="40" name="PlaceHolder 7"/>
+          <p:cNvPr id="37" name="PlaceHolder 7"/>
           <p:cNvSpPr>
             <a:spLocks noGrp="1"/>
           </p:cNvSpPr>
@@ -564,8 +525,8 @@
         </p:nvSpPr>
         <p:spPr>
           <a:xfrm>
-            <a:off x="6022080" y="3964320"/>
-            <a:ext cx="2649600" cy="2158560"/>
+            <a:off x="6022080" y="3682080"/>
+            <a:ext cx="2649600" cy="1896840"/>
           </a:xfrm>
           <a:prstGeom prst="rect">
             <a:avLst/>
@@ -576,11 +537,8 @@
             <a:normAutofit/>
           </a:bodyPr>
           <a:p>
-            <a:endParaRPr b="0" lang="en-US" sz="3200" spc="-1" strike="noStrike">
-              <a:solidFill>
-                <a:srgbClr val="000000"/>
-              </a:solidFill>
-              <a:latin typeface="Calibri"/>
+            <a:endParaRPr b="0" lang="es-ES" sz="3200" spc="-1" strike="noStrike">
+              <a:latin typeface="Arial"/>
             </a:endParaRPr>
           </a:p>
         </p:txBody>
@@ -609,7 +567,7 @@
       </p:grpSpPr>
       <p:sp>
         <p:nvSpPr>
-          <p:cNvPr id="5" name="PlaceHolder 1"/>
+          <p:cNvPr id="2" name="PlaceHolder 1"/>
           <p:cNvSpPr>
             <a:spLocks noGrp="1"/>
           </p:cNvSpPr>
@@ -619,8 +577,8 @@
         </p:nvSpPr>
         <p:spPr>
           <a:xfrm>
-            <a:off x="457200" y="274680"/>
-            <a:ext cx="8229240" cy="1142640"/>
+            <a:off x="457200" y="273600"/>
+            <a:ext cx="8229240" cy="1144800"/>
           </a:xfrm>
           <a:prstGeom prst="rect">
             <a:avLst/>
@@ -629,10 +587,8 @@
         <p:txBody>
           <a:bodyPr lIns="0" rIns="0" tIns="0" bIns="0" anchor="ctr"/>
           <a:p>
-            <a:endParaRPr b="0" lang="en-US" sz="4400" spc="-1" strike="noStrike">
-              <a:solidFill>
-                <a:srgbClr val="000000"/>
-              </a:solidFill>
+            <a:pPr algn="ctr"/>
+            <a:endParaRPr b="0" lang="es-ES" sz="4400" spc="-1" strike="noStrike">
               <a:latin typeface="Arial"/>
             </a:endParaRPr>
           </a:p>
@@ -640,7 +596,7 @@
       </p:sp>
       <p:sp>
         <p:nvSpPr>
-          <p:cNvPr id="6" name="PlaceHolder 2"/>
+          <p:cNvPr id="3" name="PlaceHolder 2"/>
           <p:cNvSpPr>
             <a:spLocks noGrp="1"/>
           </p:cNvSpPr>
@@ -650,8 +606,8 @@
         </p:nvSpPr>
         <p:spPr>
           <a:xfrm>
-            <a:off x="457200" y="1600200"/>
-            <a:ext cx="8229240" cy="4525560"/>
+            <a:off x="457200" y="1604520"/>
+            <a:ext cx="8229240" cy="3977280"/>
           </a:xfrm>
           <a:prstGeom prst="rect">
             <a:avLst/>
@@ -691,7 +647,7 @@
       </p:grpSpPr>
       <p:sp>
         <p:nvSpPr>
-          <p:cNvPr id="7" name="PlaceHolder 1"/>
+          <p:cNvPr id="4" name="PlaceHolder 1"/>
           <p:cNvSpPr>
             <a:spLocks noGrp="1"/>
           </p:cNvSpPr>
@@ -701,8 +657,8 @@
         </p:nvSpPr>
         <p:spPr>
           <a:xfrm>
-            <a:off x="457200" y="274680"/>
-            <a:ext cx="8229240" cy="1142640"/>
+            <a:off x="457200" y="273600"/>
+            <a:ext cx="8229240" cy="1144800"/>
           </a:xfrm>
           <a:prstGeom prst="rect">
             <a:avLst/>
@@ -711,10 +667,8 @@
         <p:txBody>
           <a:bodyPr lIns="0" rIns="0" tIns="0" bIns="0" anchor="ctr"/>
           <a:p>
-            <a:endParaRPr b="0" lang="en-US" sz="4400" spc="-1" strike="noStrike">
-              <a:solidFill>
-                <a:srgbClr val="000000"/>
-              </a:solidFill>
+            <a:pPr algn="ctr"/>
+            <a:endParaRPr b="0" lang="es-ES" sz="4400" spc="-1" strike="noStrike">
               <a:latin typeface="Arial"/>
             </a:endParaRPr>
           </a:p>
@@ -722,7 +676,7 @@
       </p:sp>
       <p:sp>
         <p:nvSpPr>
-          <p:cNvPr id="8" name="PlaceHolder 2"/>
+          <p:cNvPr id="5" name="PlaceHolder 2"/>
           <p:cNvSpPr>
             <a:spLocks noGrp="1"/>
           </p:cNvSpPr>
@@ -732,8 +686,8 @@
         </p:nvSpPr>
         <p:spPr>
           <a:xfrm>
-            <a:off x="457200" y="1600200"/>
-            <a:ext cx="8229240" cy="4525560"/>
+            <a:off x="457200" y="1604520"/>
+            <a:ext cx="8229240" cy="3977280"/>
           </a:xfrm>
           <a:prstGeom prst="rect">
             <a:avLst/>
@@ -744,11 +698,8 @@
             <a:normAutofit/>
           </a:bodyPr>
           <a:p>
-            <a:endParaRPr b="0" lang="en-US" sz="3200" spc="-1" strike="noStrike">
-              <a:solidFill>
-                <a:srgbClr val="000000"/>
-              </a:solidFill>
-              <a:latin typeface="Calibri"/>
+            <a:endParaRPr b="0" lang="es-ES" sz="3200" spc="-1" strike="noStrike">
+              <a:latin typeface="Arial"/>
             </a:endParaRPr>
           </a:p>
         </p:txBody>
@@ -777,7 +728,7 @@
       </p:grpSpPr>
       <p:sp>
         <p:nvSpPr>
-          <p:cNvPr id="9" name="PlaceHolder 1"/>
+          <p:cNvPr id="6" name="PlaceHolder 1"/>
           <p:cNvSpPr>
             <a:spLocks noGrp="1"/>
           </p:cNvSpPr>
@@ -787,8 +738,8 @@
         </p:nvSpPr>
         <p:spPr>
           <a:xfrm>
-            <a:off x="457200" y="274680"/>
-            <a:ext cx="8229240" cy="1142640"/>
+            <a:off x="457200" y="273600"/>
+            <a:ext cx="8229240" cy="1144800"/>
           </a:xfrm>
           <a:prstGeom prst="rect">
             <a:avLst/>
@@ -797,10 +748,8 @@
         <p:txBody>
           <a:bodyPr lIns="0" rIns="0" tIns="0" bIns="0" anchor="ctr"/>
           <a:p>
-            <a:endParaRPr b="0" lang="en-US" sz="4400" spc="-1" strike="noStrike">
-              <a:solidFill>
-                <a:srgbClr val="000000"/>
-              </a:solidFill>
+            <a:pPr algn="ctr"/>
+            <a:endParaRPr b="0" lang="es-ES" sz="4400" spc="-1" strike="noStrike">
               <a:latin typeface="Arial"/>
             </a:endParaRPr>
           </a:p>
@@ -808,7 +757,7 @@
       </p:sp>
       <p:sp>
         <p:nvSpPr>
-          <p:cNvPr id="10" name="PlaceHolder 2"/>
+          <p:cNvPr id="7" name="PlaceHolder 2"/>
           <p:cNvSpPr>
             <a:spLocks noGrp="1"/>
           </p:cNvSpPr>
@@ -818,8 +767,8 @@
         </p:nvSpPr>
         <p:spPr>
           <a:xfrm>
-            <a:off x="457200" y="1600200"/>
-            <a:ext cx="4015800" cy="4525560"/>
+            <a:off x="457200" y="1604520"/>
+            <a:ext cx="4015800" cy="3977280"/>
           </a:xfrm>
           <a:prstGeom prst="rect">
             <a:avLst/>
@@ -830,18 +779,15 @@
             <a:normAutofit/>
           </a:bodyPr>
           <a:p>
-            <a:endParaRPr b="0" lang="en-US" sz="3200" spc="-1" strike="noStrike">
-              <a:solidFill>
-                <a:srgbClr val="000000"/>
-              </a:solidFill>
-              <a:latin typeface="Calibri"/>
+            <a:endParaRPr b="0" lang="es-ES" sz="3200" spc="-1" strike="noStrike">
+              <a:latin typeface="Arial"/>
             </a:endParaRPr>
           </a:p>
         </p:txBody>
       </p:sp>
       <p:sp>
         <p:nvSpPr>
-          <p:cNvPr id="11" name="PlaceHolder 3"/>
+          <p:cNvPr id="8" name="PlaceHolder 3"/>
           <p:cNvSpPr>
             <a:spLocks noGrp="1"/>
           </p:cNvSpPr>
@@ -851,8 +797,8 @@
         </p:nvSpPr>
         <p:spPr>
           <a:xfrm>
-            <a:off x="4674240" y="1600200"/>
-            <a:ext cx="4015800" cy="4525560"/>
+            <a:off x="4674240" y="1604520"/>
+            <a:ext cx="4015800" cy="3977280"/>
           </a:xfrm>
           <a:prstGeom prst="rect">
             <a:avLst/>
@@ -863,11 +809,8 @@
             <a:normAutofit/>
           </a:bodyPr>
           <a:p>
-            <a:endParaRPr b="0" lang="en-US" sz="3200" spc="-1" strike="noStrike">
-              <a:solidFill>
-                <a:srgbClr val="000000"/>
-              </a:solidFill>
-              <a:latin typeface="Calibri"/>
+            <a:endParaRPr b="0" lang="es-ES" sz="3200" spc="-1" strike="noStrike">
+              <a:latin typeface="Arial"/>
             </a:endParaRPr>
           </a:p>
         </p:txBody>
@@ -896,7 +839,7 @@
       </p:grpSpPr>
       <p:sp>
         <p:nvSpPr>
-          <p:cNvPr id="12" name="PlaceHolder 1"/>
+          <p:cNvPr id="9" name="PlaceHolder 1"/>
           <p:cNvSpPr>
             <a:spLocks noGrp="1"/>
           </p:cNvSpPr>
@@ -906,8 +849,8 @@
         </p:nvSpPr>
         <p:spPr>
           <a:xfrm>
-            <a:off x="457200" y="274680"/>
-            <a:ext cx="8229240" cy="1142640"/>
+            <a:off x="457200" y="273600"/>
+            <a:ext cx="8229240" cy="1144800"/>
           </a:xfrm>
           <a:prstGeom prst="rect">
             <a:avLst/>
@@ -916,10 +859,8 @@
         <p:txBody>
           <a:bodyPr lIns="0" rIns="0" tIns="0" bIns="0" anchor="ctr"/>
           <a:p>
-            <a:endParaRPr b="0" lang="en-US" sz="4400" spc="-1" strike="noStrike">
-              <a:solidFill>
-                <a:srgbClr val="000000"/>
-              </a:solidFill>
+            <a:pPr algn="ctr"/>
+            <a:endParaRPr b="0" lang="es-ES" sz="4400" spc="-1" strike="noStrike">
               <a:latin typeface="Arial"/>
             </a:endParaRPr>
           </a:p>
@@ -949,7 +890,7 @@
       </p:grpSpPr>
       <p:sp>
         <p:nvSpPr>
-          <p:cNvPr id="13" name="PlaceHolder 1"/>
+          <p:cNvPr id="10" name="PlaceHolder 1"/>
           <p:cNvSpPr>
             <a:spLocks noGrp="1"/>
           </p:cNvSpPr>
@@ -959,8 +900,8 @@
         </p:nvSpPr>
         <p:spPr>
           <a:xfrm>
-            <a:off x="457200" y="274680"/>
-            <a:ext cx="8229240" cy="5297760"/>
+            <a:off x="457200" y="273600"/>
+            <a:ext cx="8229240" cy="5307840"/>
           </a:xfrm>
           <a:prstGeom prst="rect">
             <a:avLst/>
@@ -1000,7 +941,7 @@
       </p:grpSpPr>
       <p:sp>
         <p:nvSpPr>
-          <p:cNvPr id="14" name="PlaceHolder 1"/>
+          <p:cNvPr id="11" name="PlaceHolder 1"/>
           <p:cNvSpPr>
             <a:spLocks noGrp="1"/>
           </p:cNvSpPr>
@@ -1010,8 +951,8 @@
         </p:nvSpPr>
         <p:spPr>
           <a:xfrm>
-            <a:off x="457200" y="274680"/>
-            <a:ext cx="8229240" cy="1142640"/>
+            <a:off x="457200" y="273600"/>
+            <a:ext cx="8229240" cy="1144800"/>
           </a:xfrm>
           <a:prstGeom prst="rect">
             <a:avLst/>
@@ -1020,10 +961,8 @@
         <p:txBody>
           <a:bodyPr lIns="0" rIns="0" tIns="0" bIns="0" anchor="ctr"/>
           <a:p>
-            <a:endParaRPr b="0" lang="en-US" sz="4400" spc="-1" strike="noStrike">
-              <a:solidFill>
-                <a:srgbClr val="000000"/>
-              </a:solidFill>
+            <a:pPr algn="ctr"/>
+            <a:endParaRPr b="0" lang="es-ES" sz="4400" spc="-1" strike="noStrike">
               <a:latin typeface="Arial"/>
             </a:endParaRPr>
           </a:p>
@@ -1031,7 +970,7 @@
       </p:sp>
       <p:sp>
         <p:nvSpPr>
-          <p:cNvPr id="15" name="PlaceHolder 2"/>
+          <p:cNvPr id="12" name="PlaceHolder 2"/>
           <p:cNvSpPr>
             <a:spLocks noGrp="1"/>
           </p:cNvSpPr>
@@ -1041,8 +980,8 @@
         </p:nvSpPr>
         <p:spPr>
           <a:xfrm>
-            <a:off x="457200" y="1600200"/>
-            <a:ext cx="4015800" cy="2158560"/>
+            <a:off x="457200" y="1604520"/>
+            <a:ext cx="4015800" cy="1896840"/>
           </a:xfrm>
           <a:prstGeom prst="rect">
             <a:avLst/>
@@ -1053,18 +992,15 @@
             <a:normAutofit/>
           </a:bodyPr>
           <a:p>
-            <a:endParaRPr b="0" lang="en-US" sz="3200" spc="-1" strike="noStrike">
-              <a:solidFill>
-                <a:srgbClr val="000000"/>
-              </a:solidFill>
-              <a:latin typeface="Calibri"/>
+            <a:endParaRPr b="0" lang="es-ES" sz="3200" spc="-1" strike="noStrike">
+              <a:latin typeface="Arial"/>
             </a:endParaRPr>
           </a:p>
         </p:txBody>
       </p:sp>
       <p:sp>
         <p:nvSpPr>
-          <p:cNvPr id="16" name="PlaceHolder 3"/>
+          <p:cNvPr id="13" name="PlaceHolder 3"/>
           <p:cNvSpPr>
             <a:spLocks noGrp="1"/>
           </p:cNvSpPr>
@@ -1074,8 +1010,8 @@
         </p:nvSpPr>
         <p:spPr>
           <a:xfrm>
-            <a:off x="4674240" y="1600200"/>
-            <a:ext cx="4015800" cy="4525560"/>
+            <a:off x="4674240" y="1604520"/>
+            <a:ext cx="4015800" cy="3977280"/>
           </a:xfrm>
           <a:prstGeom prst="rect">
             <a:avLst/>
@@ -1086,18 +1022,15 @@
             <a:normAutofit/>
           </a:bodyPr>
           <a:p>
-            <a:endParaRPr b="0" lang="en-US" sz="3200" spc="-1" strike="noStrike">
-              <a:solidFill>
-                <a:srgbClr val="000000"/>
-              </a:solidFill>
-              <a:latin typeface="Calibri"/>
+            <a:endParaRPr b="0" lang="es-ES" sz="3200" spc="-1" strike="noStrike">
+              <a:latin typeface="Arial"/>
             </a:endParaRPr>
           </a:p>
         </p:txBody>
       </p:sp>
       <p:sp>
         <p:nvSpPr>
-          <p:cNvPr id="17" name="PlaceHolder 4"/>
+          <p:cNvPr id="14" name="PlaceHolder 4"/>
           <p:cNvSpPr>
             <a:spLocks noGrp="1"/>
           </p:cNvSpPr>
@@ -1107,8 +1040,8 @@
         </p:nvSpPr>
         <p:spPr>
           <a:xfrm>
-            <a:off x="457200" y="3964320"/>
-            <a:ext cx="4015800" cy="2158560"/>
+            <a:off x="457200" y="3682080"/>
+            <a:ext cx="4015800" cy="1896840"/>
           </a:xfrm>
           <a:prstGeom prst="rect">
             <a:avLst/>
@@ -1119,11 +1052,8 @@
             <a:normAutofit/>
           </a:bodyPr>
           <a:p>
-            <a:endParaRPr b="0" lang="en-US" sz="3200" spc="-1" strike="noStrike">
-              <a:solidFill>
-                <a:srgbClr val="000000"/>
-              </a:solidFill>
-              <a:latin typeface="Calibri"/>
+            <a:endParaRPr b="0" lang="es-ES" sz="3200" spc="-1" strike="noStrike">
+              <a:latin typeface="Arial"/>
             </a:endParaRPr>
           </a:p>
         </p:txBody>
@@ -1152,7 +1082,7 @@
       </p:grpSpPr>
       <p:sp>
         <p:nvSpPr>
-          <p:cNvPr id="18" name="PlaceHolder 1"/>
+          <p:cNvPr id="15" name="PlaceHolder 1"/>
           <p:cNvSpPr>
             <a:spLocks noGrp="1"/>
           </p:cNvSpPr>
@@ -1162,8 +1092,8 @@
         </p:nvSpPr>
         <p:spPr>
           <a:xfrm>
-            <a:off x="457200" y="274680"/>
-            <a:ext cx="8229240" cy="1142640"/>
+            <a:off x="457200" y="273600"/>
+            <a:ext cx="8229240" cy="1144800"/>
           </a:xfrm>
           <a:prstGeom prst="rect">
             <a:avLst/>
@@ -1172,10 +1102,8 @@
         <p:txBody>
           <a:bodyPr lIns="0" rIns="0" tIns="0" bIns="0" anchor="ctr"/>
           <a:p>
-            <a:endParaRPr b="0" lang="en-US" sz="4400" spc="-1" strike="noStrike">
-              <a:solidFill>
-                <a:srgbClr val="000000"/>
-              </a:solidFill>
+            <a:pPr algn="ctr"/>
+            <a:endParaRPr b="0" lang="es-ES" sz="4400" spc="-1" strike="noStrike">
               <a:latin typeface="Arial"/>
             </a:endParaRPr>
           </a:p>
@@ -1183,7 +1111,7 @@
       </p:sp>
       <p:sp>
         <p:nvSpPr>
-          <p:cNvPr id="19" name="PlaceHolder 2"/>
+          <p:cNvPr id="16" name="PlaceHolder 2"/>
           <p:cNvSpPr>
             <a:spLocks noGrp="1"/>
           </p:cNvSpPr>
@@ -1193,8 +1121,8 @@
         </p:nvSpPr>
         <p:spPr>
           <a:xfrm>
-            <a:off x="457200" y="1600200"/>
-            <a:ext cx="4015800" cy="4525560"/>
+            <a:off x="457200" y="1604520"/>
+            <a:ext cx="4015800" cy="3977280"/>
           </a:xfrm>
           <a:prstGeom prst="rect">
             <a:avLst/>
@@ -1205,18 +1133,15 @@
             <a:normAutofit/>
           </a:bodyPr>
           <a:p>
-            <a:endParaRPr b="0" lang="en-US" sz="3200" spc="-1" strike="noStrike">
-              <a:solidFill>
-                <a:srgbClr val="000000"/>
-              </a:solidFill>
-              <a:latin typeface="Calibri"/>
+            <a:endParaRPr b="0" lang="es-ES" sz="3200" spc="-1" strike="noStrike">
+              <a:latin typeface="Arial"/>
             </a:endParaRPr>
           </a:p>
         </p:txBody>
       </p:sp>
       <p:sp>
         <p:nvSpPr>
-          <p:cNvPr id="20" name="PlaceHolder 3"/>
+          <p:cNvPr id="17" name="PlaceHolder 3"/>
           <p:cNvSpPr>
             <a:spLocks noGrp="1"/>
           </p:cNvSpPr>
@@ -1226,8 +1151,8 @@
         </p:nvSpPr>
         <p:spPr>
           <a:xfrm>
-            <a:off x="4674240" y="1600200"/>
-            <a:ext cx="4015800" cy="2158560"/>
+            <a:off x="4674240" y="1604520"/>
+            <a:ext cx="4015800" cy="1896840"/>
           </a:xfrm>
           <a:prstGeom prst="rect">
             <a:avLst/>
@@ -1238,18 +1163,15 @@
             <a:normAutofit/>
           </a:bodyPr>
           <a:p>
-            <a:endParaRPr b="0" lang="en-US" sz="3200" spc="-1" strike="noStrike">
-              <a:solidFill>
-                <a:srgbClr val="000000"/>
-              </a:solidFill>
-              <a:latin typeface="Calibri"/>
+            <a:endParaRPr b="0" lang="es-ES" sz="3200" spc="-1" strike="noStrike">
+              <a:latin typeface="Arial"/>
             </a:endParaRPr>
           </a:p>
         </p:txBody>
       </p:sp>
       <p:sp>
         <p:nvSpPr>
-          <p:cNvPr id="21" name="PlaceHolder 4"/>
+          <p:cNvPr id="18" name="PlaceHolder 4"/>
           <p:cNvSpPr>
             <a:spLocks noGrp="1"/>
           </p:cNvSpPr>
@@ -1259,8 +1181,8 @@
         </p:nvSpPr>
         <p:spPr>
           <a:xfrm>
-            <a:off x="4674240" y="3964320"/>
-            <a:ext cx="4015800" cy="2158560"/>
+            <a:off x="4674240" y="3682080"/>
+            <a:ext cx="4015800" cy="1896840"/>
           </a:xfrm>
           <a:prstGeom prst="rect">
             <a:avLst/>
@@ -1271,11 +1193,8 @@
             <a:normAutofit/>
           </a:bodyPr>
           <a:p>
-            <a:endParaRPr b="0" lang="en-US" sz="3200" spc="-1" strike="noStrike">
-              <a:solidFill>
-                <a:srgbClr val="000000"/>
-              </a:solidFill>
-              <a:latin typeface="Calibri"/>
+            <a:endParaRPr b="0" lang="es-ES" sz="3200" spc="-1" strike="noStrike">
+              <a:latin typeface="Arial"/>
             </a:endParaRPr>
           </a:p>
         </p:txBody>
@@ -1304,7 +1223,7 @@
       </p:grpSpPr>
       <p:sp>
         <p:nvSpPr>
-          <p:cNvPr id="22" name="PlaceHolder 1"/>
+          <p:cNvPr id="19" name="PlaceHolder 1"/>
           <p:cNvSpPr>
             <a:spLocks noGrp="1"/>
           </p:cNvSpPr>
@@ -1314,8 +1233,8 @@
         </p:nvSpPr>
         <p:spPr>
           <a:xfrm>
-            <a:off x="457200" y="274680"/>
-            <a:ext cx="8229240" cy="1142640"/>
+            <a:off x="457200" y="273600"/>
+            <a:ext cx="8229240" cy="1144800"/>
           </a:xfrm>
           <a:prstGeom prst="rect">
             <a:avLst/>
@@ -1324,10 +1243,8 @@
         <p:txBody>
           <a:bodyPr lIns="0" rIns="0" tIns="0" bIns="0" anchor="ctr"/>
           <a:p>
-            <a:endParaRPr b="0" lang="en-US" sz="4400" spc="-1" strike="noStrike">
-              <a:solidFill>
-                <a:srgbClr val="000000"/>
-              </a:solidFill>
+            <a:pPr algn="ctr"/>
+            <a:endParaRPr b="0" lang="es-ES" sz="4400" spc="-1" strike="noStrike">
               <a:latin typeface="Arial"/>
             </a:endParaRPr>
           </a:p>
@@ -1335,7 +1252,7 @@
       </p:sp>
       <p:sp>
         <p:nvSpPr>
-          <p:cNvPr id="23" name="PlaceHolder 2"/>
+          <p:cNvPr id="20" name="PlaceHolder 2"/>
           <p:cNvSpPr>
             <a:spLocks noGrp="1"/>
           </p:cNvSpPr>
@@ -1345,8 +1262,8 @@
         </p:nvSpPr>
         <p:spPr>
           <a:xfrm>
-            <a:off x="457200" y="1600200"/>
-            <a:ext cx="4015800" cy="2158560"/>
+            <a:off x="457200" y="1604520"/>
+            <a:ext cx="4015800" cy="1896840"/>
           </a:xfrm>
           <a:prstGeom prst="rect">
             <a:avLst/>
@@ -1357,18 +1274,15 @@
             <a:normAutofit/>
           </a:bodyPr>
           <a:p>
-            <a:endParaRPr b="0" lang="en-US" sz="3200" spc="-1" strike="noStrike">
-              <a:solidFill>
-                <a:srgbClr val="000000"/>
-              </a:solidFill>
-              <a:latin typeface="Calibri"/>
+            <a:endParaRPr b="0" lang="es-ES" sz="3200" spc="-1" strike="noStrike">
+              <a:latin typeface="Arial"/>
             </a:endParaRPr>
           </a:p>
         </p:txBody>
       </p:sp>
       <p:sp>
         <p:nvSpPr>
-          <p:cNvPr id="24" name="PlaceHolder 3"/>
+          <p:cNvPr id="21" name="PlaceHolder 3"/>
           <p:cNvSpPr>
             <a:spLocks noGrp="1"/>
           </p:cNvSpPr>
@@ -1378,8 +1292,8 @@
         </p:nvSpPr>
         <p:spPr>
           <a:xfrm>
-            <a:off x="4674240" y="1600200"/>
-            <a:ext cx="4015800" cy="2158560"/>
+            <a:off x="4674240" y="1604520"/>
+            <a:ext cx="4015800" cy="1896840"/>
           </a:xfrm>
           <a:prstGeom prst="rect">
             <a:avLst/>
@@ -1390,18 +1304,15 @@
             <a:normAutofit/>
           </a:bodyPr>
           <a:p>
-            <a:endParaRPr b="0" lang="en-US" sz="3200" spc="-1" strike="noStrike">
-              <a:solidFill>
-                <a:srgbClr val="000000"/>
-              </a:solidFill>
-              <a:latin typeface="Calibri"/>
+            <a:endParaRPr b="0" lang="es-ES" sz="3200" spc="-1" strike="noStrike">
+              <a:latin typeface="Arial"/>
             </a:endParaRPr>
           </a:p>
         </p:txBody>
       </p:sp>
       <p:sp>
         <p:nvSpPr>
-          <p:cNvPr id="25" name="PlaceHolder 4"/>
+          <p:cNvPr id="22" name="PlaceHolder 4"/>
           <p:cNvSpPr>
             <a:spLocks noGrp="1"/>
           </p:cNvSpPr>
@@ -1411,8 +1322,8 @@
         </p:nvSpPr>
         <p:spPr>
           <a:xfrm>
-            <a:off x="457200" y="3964320"/>
-            <a:ext cx="8229240" cy="2158560"/>
+            <a:off x="457200" y="3682080"/>
+            <a:ext cx="8229240" cy="1896840"/>
           </a:xfrm>
           <a:prstGeom prst="rect">
             <a:avLst/>
@@ -1423,11 +1334,8 @@
             <a:normAutofit/>
           </a:bodyPr>
           <a:p>
-            <a:endParaRPr b="0" lang="en-US" sz="3200" spc="-1" strike="noStrike">
-              <a:solidFill>
-                <a:srgbClr val="000000"/>
-              </a:solidFill>
-              <a:latin typeface="Calibri"/>
+            <a:endParaRPr b="0" lang="es-ES" sz="3200" spc="-1" strike="noStrike">
+              <a:latin typeface="Arial"/>
             </a:endParaRPr>
           </a:p>
         </p:txBody>
@@ -1473,34 +1381,282 @@
         </p:nvSpPr>
         <p:spPr>
           <a:xfrm>
-            <a:off x="457200" y="274680"/>
-            <a:ext cx="8229240" cy="1142640"/>
+            <a:off x="457200" y="273600"/>
+            <a:ext cx="8229240" cy="1144800"/>
           </a:xfrm>
           <a:prstGeom prst="rect">
             <a:avLst/>
           </a:prstGeom>
         </p:spPr>
         <p:txBody>
-          <a:bodyPr anchor="ctr"/>
-          <a:p>
-            <a:pPr algn="ctr">
-              <a:lnSpc>
-                <a:spcPct val="100000"/>
-              </a:lnSpc>
-            </a:pPr>
-            <a:r>
-              <a:rPr b="0" lang="en-US" sz="4400" spc="-1" strike="noStrike">
-                <a:solidFill>
-                  <a:srgbClr val="000000"/>
-                </a:solidFill>
-                <a:latin typeface="Calibri"/>
-              </a:rPr>
-              <a:t>Click to edit Master title style</a:t>
-            </a:r>
-            <a:endParaRPr b="0" lang="en-US" sz="4400" spc="-1" strike="noStrike">
-              <a:solidFill>
-                <a:srgbClr val="000000"/>
-              </a:solidFill>
+          <a:bodyPr lIns="0" rIns="0" tIns="0" bIns="0" anchor="ctr"/>
+          <a:p>
+            <a:pPr algn="ctr"/>
+            <a:r>
+              <a:rPr b="0" lang="es-ES" sz="4400" spc="-1" strike="noStrike">
+                <a:latin typeface="Arial"/>
+              </a:rPr>
+              <a:t>P</a:t>
+            </a:r>
+            <a:r>
+              <a:rPr b="0" lang="es-ES" sz="4400" spc="-1" strike="noStrike">
+                <a:latin typeface="Arial"/>
+              </a:rPr>
+              <a:t>u</a:t>
+            </a:r>
+            <a:r>
+              <a:rPr b="0" lang="es-ES" sz="4400" spc="-1" strike="noStrike">
+                <a:latin typeface="Arial"/>
+              </a:rPr>
+              <a:t>l</a:t>
+            </a:r>
+            <a:r>
+              <a:rPr b="0" lang="es-ES" sz="4400" spc="-1" strike="noStrike">
+                <a:latin typeface="Arial"/>
+              </a:rPr>
+              <a:t>s</a:t>
+            </a:r>
+            <a:r>
+              <a:rPr b="0" lang="es-ES" sz="4400" spc="-1" strike="noStrike">
+                <a:latin typeface="Arial"/>
+              </a:rPr>
+              <a:t>e</a:t>
+            </a:r>
+            <a:r>
+              <a:rPr b="0" lang="es-ES" sz="4400" spc="-1" strike="noStrike">
+                <a:latin typeface="Arial"/>
+              </a:rPr>
+              <a:t> </a:t>
+            </a:r>
+            <a:r>
+              <a:rPr b="0" lang="es-ES" sz="4400" spc="-1" strike="noStrike">
+                <a:latin typeface="Arial"/>
+              </a:rPr>
+              <a:t>p</a:t>
+            </a:r>
+            <a:r>
+              <a:rPr b="0" lang="es-ES" sz="4400" spc="-1" strike="noStrike">
+                <a:latin typeface="Arial"/>
+              </a:rPr>
+              <a:t>a</a:t>
+            </a:r>
+            <a:r>
+              <a:rPr b="0" lang="es-ES" sz="4400" spc="-1" strike="noStrike">
+                <a:latin typeface="Arial"/>
+              </a:rPr>
+              <a:t>r</a:t>
+            </a:r>
+            <a:r>
+              <a:rPr b="0" lang="es-ES" sz="4400" spc="-1" strike="noStrike">
+                <a:latin typeface="Arial"/>
+              </a:rPr>
+              <a:t>a</a:t>
+            </a:r>
+            <a:r>
+              <a:rPr b="0" lang="es-ES" sz="4400" spc="-1" strike="noStrike">
+                <a:latin typeface="Arial"/>
+              </a:rPr>
+              <a:t> </a:t>
+            </a:r>
+            <a:r>
+              <a:rPr b="0" lang="es-ES" sz="4400" spc="-1" strike="noStrike">
+                <a:latin typeface="Arial"/>
+              </a:rPr>
+              <a:t>e</a:t>
+            </a:r>
+            <a:r>
+              <a:rPr b="0" lang="es-ES" sz="4400" spc="-1" strike="noStrike">
+                <a:latin typeface="Arial"/>
+              </a:rPr>
+              <a:t>d</a:t>
+            </a:r>
+            <a:r>
+              <a:rPr b="0" lang="es-ES" sz="4400" spc="-1" strike="noStrike">
+                <a:latin typeface="Arial"/>
+              </a:rPr>
+              <a:t>it</a:t>
+            </a:r>
+            <a:r>
+              <a:rPr b="0" lang="es-ES" sz="4400" spc="-1" strike="noStrike">
+                <a:latin typeface="Arial"/>
+              </a:rPr>
+              <a:t>a</a:t>
+            </a:r>
+            <a:r>
+              <a:rPr b="0" lang="es-ES" sz="4400" spc="-1" strike="noStrike">
+                <a:latin typeface="Arial"/>
+              </a:rPr>
+              <a:t>r </a:t>
+            </a:r>
+            <a:r>
+              <a:rPr b="0" lang="es-ES" sz="4400" spc="-1" strike="noStrike">
+                <a:latin typeface="Arial"/>
+              </a:rPr>
+              <a:t>e</a:t>
+            </a:r>
+            <a:r>
+              <a:rPr b="0" lang="es-ES" sz="4400" spc="-1" strike="noStrike">
+                <a:latin typeface="Arial"/>
+              </a:rPr>
+              <a:t>l </a:t>
+            </a:r>
+            <a:r>
+              <a:rPr b="0" lang="es-ES" sz="4400" spc="-1" strike="noStrike">
+                <a:latin typeface="Arial"/>
+              </a:rPr>
+              <a:t>f</a:t>
+            </a:r>
+            <a:r>
+              <a:rPr b="0" lang="es-ES" sz="4400" spc="-1" strike="noStrike">
+                <a:latin typeface="Arial"/>
+              </a:rPr>
+              <a:t>o</a:t>
+            </a:r>
+            <a:r>
+              <a:rPr b="0" lang="es-ES" sz="4400" spc="-1" strike="noStrike">
+                <a:latin typeface="Arial"/>
+              </a:rPr>
+              <a:t>r</a:t>
+            </a:r>
+            <a:r>
+              <a:rPr b="0" lang="es-ES" sz="4400" spc="-1" strike="noStrike">
+                <a:latin typeface="Arial"/>
+              </a:rPr>
+              <a:t>m</a:t>
+            </a:r>
+            <a:r>
+              <a:rPr b="0" lang="es-ES" sz="4400" spc="-1" strike="noStrike">
+                <a:latin typeface="Arial"/>
+              </a:rPr>
+              <a:t>a</a:t>
+            </a:r>
+            <a:r>
+              <a:rPr b="0" lang="es-ES" sz="4400" spc="-1" strike="noStrike">
+                <a:latin typeface="Arial"/>
+              </a:rPr>
+              <a:t>t</a:t>
+            </a:r>
+            <a:r>
+              <a:rPr b="0" lang="es-ES" sz="4400" spc="-1" strike="noStrike">
+                <a:latin typeface="Arial"/>
+              </a:rPr>
+              <a:t>o</a:t>
+            </a:r>
+            <a:r>
+              <a:rPr b="0" lang="es-ES" sz="4400" spc="-1" strike="noStrike">
+                <a:latin typeface="Arial"/>
+              </a:rPr>
+              <a:t> </a:t>
+            </a:r>
+            <a:r>
+              <a:rPr b="0" lang="es-ES" sz="4400" spc="-1" strike="noStrike">
+                <a:latin typeface="Arial"/>
+              </a:rPr>
+              <a:t>d</a:t>
+            </a:r>
+            <a:r>
+              <a:rPr b="0" lang="es-ES" sz="4400" spc="-1" strike="noStrike">
+                <a:latin typeface="Arial"/>
+              </a:rPr>
+              <a:t>e</a:t>
+            </a:r>
+            <a:r>
+              <a:rPr b="0" lang="es-ES" sz="4400" spc="-1" strike="noStrike">
+                <a:latin typeface="Arial"/>
+              </a:rPr>
+              <a:t>l </a:t>
+            </a:r>
+            <a:r>
+              <a:rPr b="0" lang="es-ES" sz="4400" spc="-1" strike="noStrike">
+                <a:latin typeface="Arial"/>
+              </a:rPr>
+              <a:t>t</a:t>
+            </a:r>
+            <a:r>
+              <a:rPr b="0" lang="es-ES" sz="4400" spc="-1" strike="noStrike">
+                <a:latin typeface="Arial"/>
+              </a:rPr>
+              <a:t>e</a:t>
+            </a:r>
+            <a:r>
+              <a:rPr b="0" lang="es-ES" sz="4400" spc="-1" strike="noStrike">
+                <a:latin typeface="Arial"/>
+              </a:rPr>
+              <a:t>x</a:t>
+            </a:r>
+            <a:r>
+              <a:rPr b="0" lang="es-ES" sz="4400" spc="-1" strike="noStrike">
+                <a:latin typeface="Arial"/>
+              </a:rPr>
+              <a:t>t</a:t>
+            </a:r>
+            <a:r>
+              <a:rPr b="0" lang="es-ES" sz="4400" spc="-1" strike="noStrike">
+                <a:latin typeface="Arial"/>
+              </a:rPr>
+              <a:t>o</a:t>
+            </a:r>
+            <a:r>
+              <a:rPr b="0" lang="es-ES" sz="4400" spc="-1" strike="noStrike">
+                <a:latin typeface="Arial"/>
+              </a:rPr>
+              <a:t> </a:t>
+            </a:r>
+            <a:r>
+              <a:rPr b="0" lang="es-ES" sz="4400" spc="-1" strike="noStrike">
+                <a:latin typeface="Arial"/>
+              </a:rPr>
+              <a:t>d</a:t>
+            </a:r>
+            <a:r>
+              <a:rPr b="0" lang="es-ES" sz="4400" spc="-1" strike="noStrike">
+                <a:latin typeface="Arial"/>
+              </a:rPr>
+              <a:t>e</a:t>
+            </a:r>
+            <a:r>
+              <a:rPr b="0" lang="es-ES" sz="4400" spc="-1" strike="noStrike">
+                <a:latin typeface="Arial"/>
+              </a:rPr>
+              <a:t> </a:t>
+            </a:r>
+            <a:r>
+              <a:rPr b="0" lang="es-ES" sz="4400" spc="-1" strike="noStrike">
+                <a:latin typeface="Arial"/>
+              </a:rPr>
+              <a:t>t</a:t>
+            </a:r>
+            <a:r>
+              <a:rPr b="0" lang="es-ES" sz="4400" spc="-1" strike="noStrike">
+                <a:latin typeface="Arial"/>
+              </a:rPr>
+              <a:t>í</a:t>
+            </a:r>
+            <a:r>
+              <a:rPr b="0" lang="es-ES" sz="4400" spc="-1" strike="noStrike">
+                <a:latin typeface="Arial"/>
+              </a:rPr>
+              <a:t>t</a:t>
+            </a:r>
+            <a:r>
+              <a:rPr b="0" lang="es-ES" sz="4400" spc="-1" strike="noStrike">
+                <a:latin typeface="Arial"/>
+              </a:rPr>
+              <a:t>u</a:t>
+            </a:r>
+            <a:r>
+              <a:rPr b="0" lang="es-ES" sz="4400" spc="-1" strike="noStrike">
+                <a:latin typeface="Arial"/>
+              </a:rPr>
+              <a:t>l</a:t>
+            </a:r>
+            <a:r>
+              <a:rPr b="0" lang="es-ES" sz="4400" spc="-1" strike="noStrike">
+                <a:latin typeface="Arial"/>
+              </a:rPr>
+              <a:t>o</a:t>
+            </a:r>
+            <a:endParaRPr b="0" lang="es-ES" sz="4400" spc="-1" strike="noStrike">
               <a:latin typeface="Arial"/>
             </a:endParaRPr>
           </a:p>
@@ -1518,275 +1674,169 @@
         </p:nvSpPr>
         <p:spPr>
           <a:xfrm>
-            <a:off x="457200" y="1600200"/>
-            <a:ext cx="8229240" cy="4525560"/>
+            <a:off x="457200" y="1604520"/>
+            <a:ext cx="8229240" cy="3977280"/>
           </a:xfrm>
           <a:prstGeom prst="rect">
             <a:avLst/>
           </a:prstGeom>
         </p:spPr>
         <p:txBody>
-          <a:bodyPr/>
-          <a:p>
-            <a:pPr marL="343080" indent="-342720">
-              <a:lnSpc>
-                <a:spcPct val="100000"/>
-              </a:lnSpc>
+          <a:bodyPr lIns="0" rIns="0" tIns="0" bIns="0">
+            <a:normAutofit/>
+          </a:bodyPr>
+          <a:p>
+            <a:pPr marL="432000" indent="-324000">
               <a:spcBef>
-                <a:spcPts val="641"/>
+                <a:spcPts val="1417"/>
               </a:spcBef>
               <a:buClr>
                 <a:srgbClr val="000000"/>
               </a:buClr>
-              <a:buFont typeface="Arial"/>
-              <a:buChar char="•"/>
+              <a:buSzPct val="45000"/>
+              <a:buFont typeface="Wingdings" charset="2"/>
+              <a:buChar char=""/>
             </a:pPr>
             <a:r>
-              <a:rPr b="0" lang="en-US" sz="3200" spc="-1" strike="noStrike">
-                <a:solidFill>
-                  <a:srgbClr val="000000"/>
-                </a:solidFill>
-                <a:latin typeface="Calibri"/>
-              </a:rPr>
-              <a:t>Click to edit Master text styles</a:t>
-            </a:r>
-            <a:endParaRPr b="0" lang="en-US" sz="3200" spc="-1" strike="noStrike">
-              <a:solidFill>
-                <a:srgbClr val="000000"/>
-              </a:solidFill>
-              <a:latin typeface="Calibri"/>
-            </a:endParaRPr>
-          </a:p>
-          <a:p>
-            <a:pPr lvl="1" marL="743040" indent="-285480">
-              <a:lnSpc>
-                <a:spcPct val="100000"/>
-              </a:lnSpc>
+              <a:rPr b="0" lang="es-ES" sz="3200" spc="-1" strike="noStrike">
+                <a:latin typeface="Arial"/>
+              </a:rPr>
+              <a:t>Pulse para editar el formato de esquema del texto</a:t>
+            </a:r>
+            <a:endParaRPr b="0" lang="es-ES" sz="3200" spc="-1" strike="noStrike">
+              <a:latin typeface="Arial"/>
+            </a:endParaRPr>
+          </a:p>
+          <a:p>
+            <a:pPr lvl="1" marL="864000" indent="-324000">
               <a:spcBef>
-                <a:spcPts val="561"/>
+                <a:spcPts val="1134"/>
               </a:spcBef>
               <a:buClr>
                 <a:srgbClr val="000000"/>
               </a:buClr>
-              <a:buFont typeface="Arial"/>
-              <a:buChar char="–"/>
+              <a:buSzPct val="75000"/>
+              <a:buFont typeface="Symbol" charset="2"/>
+              <a:buChar char=""/>
             </a:pPr>
             <a:r>
-              <a:rPr b="0" lang="en-US" sz="2800" spc="-1" strike="noStrike">
-                <a:solidFill>
-                  <a:srgbClr val="000000"/>
-                </a:solidFill>
-                <a:latin typeface="Calibri"/>
-              </a:rPr>
-              <a:t>Second level</a:t>
-            </a:r>
-            <a:endParaRPr b="0" lang="en-US" sz="2800" spc="-1" strike="noStrike">
-              <a:solidFill>
-                <a:srgbClr val="000000"/>
-              </a:solidFill>
-              <a:latin typeface="Calibri"/>
-            </a:endParaRPr>
-          </a:p>
-          <a:p>
-            <a:pPr lvl="2" marL="1143000" indent="-228240">
-              <a:lnSpc>
-                <a:spcPct val="100000"/>
-              </a:lnSpc>
+              <a:rPr b="0" lang="es-ES" sz="2800" spc="-1" strike="noStrike">
+                <a:latin typeface="Arial"/>
+              </a:rPr>
+              <a:t>Segundo nivel del esquema</a:t>
+            </a:r>
+            <a:endParaRPr b="0" lang="es-ES" sz="2800" spc="-1" strike="noStrike">
+              <a:latin typeface="Arial"/>
+            </a:endParaRPr>
+          </a:p>
+          <a:p>
+            <a:pPr lvl="2" marL="1296000" indent="-288000">
               <a:spcBef>
-                <a:spcPts val="479"/>
+                <a:spcPts val="850"/>
               </a:spcBef>
               <a:buClr>
                 <a:srgbClr val="000000"/>
               </a:buClr>
-              <a:buFont typeface="Arial"/>
-              <a:buChar char="•"/>
+              <a:buSzPct val="45000"/>
+              <a:buFont typeface="Wingdings" charset="2"/>
+              <a:buChar char=""/>
             </a:pPr>
             <a:r>
-              <a:rPr b="0" lang="en-US" sz="2400" spc="-1" strike="noStrike">
-                <a:solidFill>
-                  <a:srgbClr val="000000"/>
-                </a:solidFill>
-                <a:latin typeface="Calibri"/>
-              </a:rPr>
-              <a:t>Third level</a:t>
-            </a:r>
-            <a:endParaRPr b="0" lang="en-US" sz="2400" spc="-1" strike="noStrike">
-              <a:solidFill>
-                <a:srgbClr val="000000"/>
-              </a:solidFill>
-              <a:latin typeface="Calibri"/>
-            </a:endParaRPr>
-          </a:p>
-          <a:p>
-            <a:pPr lvl="3" marL="1600200" indent="-228240">
-              <a:lnSpc>
-                <a:spcPct val="100000"/>
-              </a:lnSpc>
+              <a:rPr b="0" lang="es-ES" sz="2400" spc="-1" strike="noStrike">
+                <a:latin typeface="Arial"/>
+              </a:rPr>
+              <a:t>Tercer nivel del esquema</a:t>
+            </a:r>
+            <a:endParaRPr b="0" lang="es-ES" sz="2400" spc="-1" strike="noStrike">
+              <a:latin typeface="Arial"/>
+            </a:endParaRPr>
+          </a:p>
+          <a:p>
+            <a:pPr lvl="3" marL="1728000" indent="-216000">
               <a:spcBef>
-                <a:spcPts val="400"/>
+                <a:spcPts val="567"/>
               </a:spcBef>
               <a:buClr>
                 <a:srgbClr val="000000"/>
               </a:buClr>
-              <a:buFont typeface="Arial"/>
-              <a:buChar char="–"/>
+              <a:buSzPct val="75000"/>
+              <a:buFont typeface="Symbol" charset="2"/>
+              <a:buChar char=""/>
             </a:pPr>
             <a:r>
-              <a:rPr b="0" lang="en-US" sz="2000" spc="-1" strike="noStrike">
-                <a:solidFill>
-                  <a:srgbClr val="000000"/>
-                </a:solidFill>
-                <a:latin typeface="Calibri"/>
-              </a:rPr>
-              <a:t>Fourth level</a:t>
-            </a:r>
-            <a:endParaRPr b="0" lang="en-US" sz="2000" spc="-1" strike="noStrike">
-              <a:solidFill>
-                <a:srgbClr val="000000"/>
-              </a:solidFill>
-              <a:latin typeface="Calibri"/>
-            </a:endParaRPr>
-          </a:p>
-          <a:p>
-            <a:pPr lvl="4" marL="2057400" indent="-228240">
-              <a:lnSpc>
-                <a:spcPct val="100000"/>
-              </a:lnSpc>
+              <a:rPr b="0" lang="es-ES" sz="2000" spc="-1" strike="noStrike">
+                <a:latin typeface="Arial"/>
+              </a:rPr>
+              <a:t>Cuarto nivel del esquema</a:t>
+            </a:r>
+            <a:endParaRPr b="0" lang="es-ES" sz="2000" spc="-1" strike="noStrike">
+              <a:latin typeface="Arial"/>
+            </a:endParaRPr>
+          </a:p>
+          <a:p>
+            <a:pPr lvl="4" marL="2160000" indent="-216000">
               <a:spcBef>
-                <a:spcPts val="400"/>
+                <a:spcPts val="283"/>
               </a:spcBef>
               <a:buClr>
                 <a:srgbClr val="000000"/>
               </a:buClr>
-              <a:buFont typeface="Arial"/>
-              <a:buChar char="»"/>
+              <a:buSzPct val="45000"/>
+              <a:buFont typeface="Wingdings" charset="2"/>
+              <a:buChar char=""/>
             </a:pPr>
             <a:r>
-              <a:rPr b="0" lang="en-US" sz="2000" spc="-1" strike="noStrike">
-                <a:solidFill>
-                  <a:srgbClr val="000000"/>
-                </a:solidFill>
-                <a:latin typeface="Calibri"/>
-              </a:rPr>
-              <a:t>Fifth level</a:t>
-            </a:r>
-            <a:endParaRPr b="0" lang="en-US" sz="2000" spc="-1" strike="noStrike">
-              <a:solidFill>
+              <a:rPr b="0" lang="es-ES" sz="2000" spc="-1" strike="noStrike">
+                <a:latin typeface="Arial"/>
+              </a:rPr>
+              <a:t>Quinto nivel del esquema</a:t>
+            </a:r>
+            <a:endParaRPr b="0" lang="es-ES" sz="2000" spc="-1" strike="noStrike">
+              <a:latin typeface="Arial"/>
+            </a:endParaRPr>
+          </a:p>
+          <a:p>
+            <a:pPr lvl="5" marL="2592000" indent="-216000">
+              <a:spcBef>
+                <a:spcPts val="283"/>
+              </a:spcBef>
+              <a:buClr>
                 <a:srgbClr val="000000"/>
-              </a:solidFill>
-              <a:latin typeface="Calibri"/>
-            </a:endParaRPr>
-          </a:p>
-        </p:txBody>
-      </p:sp>
-      <p:sp>
-        <p:nvSpPr>
-          <p:cNvPr id="2" name="PlaceHolder 3"/>
-          <p:cNvSpPr>
-            <a:spLocks noGrp="1"/>
-          </p:cNvSpPr>
-          <p:nvPr>
-            <p:ph type="dt"/>
-          </p:nvPr>
-        </p:nvSpPr>
-        <p:spPr>
-          <a:xfrm>
-            <a:off x="457200" y="6356520"/>
-            <a:ext cx="2133360" cy="364680"/>
-          </a:xfrm>
-          <a:prstGeom prst="rect">
-            <a:avLst/>
-          </a:prstGeom>
-        </p:spPr>
-        <p:txBody>
-          <a:bodyPr anchor="ctr"/>
-          <a:p>
-            <a:pPr>
-              <a:lnSpc>
-                <a:spcPct val="100000"/>
-              </a:lnSpc>
+              </a:buClr>
+              <a:buSzPct val="45000"/>
+              <a:buFont typeface="Wingdings" charset="2"/>
+              <a:buChar char=""/>
             </a:pPr>
-            <a:fld id="{2B5794E2-5E30-4D09-8A97-D6C18477D56D}" type="datetime">
-              <a:rPr b="0" lang="es-ES" sz="1200" spc="-1" strike="noStrike">
-                <a:solidFill>
-                  <a:srgbClr val="8b8b8b"/>
-                </a:solidFill>
-                <a:latin typeface="Calibri"/>
-              </a:rPr>
-              <a:t>11/03/19</a:t>
-            </a:fld>
-            <a:endParaRPr b="0" lang="es-ES" sz="1200" spc="-1" strike="noStrike">
-              <a:latin typeface="Times New Roman"/>
-            </a:endParaRPr>
-          </a:p>
-        </p:txBody>
-      </p:sp>
-      <p:sp>
-        <p:nvSpPr>
-          <p:cNvPr id="3" name="PlaceHolder 4"/>
-          <p:cNvSpPr>
-            <a:spLocks noGrp="1"/>
-          </p:cNvSpPr>
-          <p:nvPr>
-            <p:ph type="ftr"/>
-          </p:nvPr>
-        </p:nvSpPr>
-        <p:spPr>
-          <a:xfrm>
-            <a:off x="3124080" y="6356520"/>
-            <a:ext cx="2895120" cy="364680"/>
-          </a:xfrm>
-          <a:prstGeom prst="rect">
-            <a:avLst/>
-          </a:prstGeom>
-        </p:spPr>
-        <p:txBody>
-          <a:bodyPr anchor="ctr"/>
-          <a:p>
-            <a:endParaRPr b="0" lang="es-ES" sz="2400" spc="-1" strike="noStrike">
-              <a:latin typeface="Times New Roman"/>
-            </a:endParaRPr>
-          </a:p>
-        </p:txBody>
-      </p:sp>
-      <p:sp>
-        <p:nvSpPr>
-          <p:cNvPr id="4" name="PlaceHolder 5"/>
-          <p:cNvSpPr>
-            <a:spLocks noGrp="1"/>
-          </p:cNvSpPr>
-          <p:nvPr>
-            <p:ph type="sldNum"/>
-          </p:nvPr>
-        </p:nvSpPr>
-        <p:spPr>
-          <a:xfrm>
-            <a:off x="6553080" y="6356520"/>
-            <a:ext cx="2133360" cy="364680"/>
-          </a:xfrm>
-          <a:prstGeom prst="rect">
-            <a:avLst/>
-          </a:prstGeom>
-        </p:spPr>
-        <p:txBody>
-          <a:bodyPr anchor="ctr"/>
-          <a:p>
-            <a:pPr algn="r">
-              <a:lnSpc>
-                <a:spcPct val="100000"/>
-              </a:lnSpc>
+            <a:r>
+              <a:rPr b="0" lang="es-ES" sz="2000" spc="-1" strike="noStrike">
+                <a:latin typeface="Arial"/>
+              </a:rPr>
+              <a:t>Sexto nivel del esquema</a:t>
+            </a:r>
+            <a:endParaRPr b="0" lang="es-ES" sz="2000" spc="-1" strike="noStrike">
+              <a:latin typeface="Arial"/>
+            </a:endParaRPr>
+          </a:p>
+          <a:p>
+            <a:pPr lvl="6" marL="3024000" indent="-216000">
+              <a:spcBef>
+                <a:spcPts val="283"/>
+              </a:spcBef>
+              <a:buClr>
+                <a:srgbClr val="000000"/>
+              </a:buClr>
+              <a:buSzPct val="45000"/>
+              <a:buFont typeface="Wingdings" charset="2"/>
+              <a:buChar char=""/>
             </a:pPr>
-            <a:fld id="{69C24A18-36F1-475D-B968-8CF5FED9B763}" type="slidenum">
-              <a:rPr b="0" lang="es-ES" sz="1200" spc="-1" strike="noStrike">
-                <a:solidFill>
-                  <a:srgbClr val="8b8b8b"/>
-                </a:solidFill>
-                <a:latin typeface="Calibri"/>
-              </a:rPr>
-              <a:t>&lt;número&gt;</a:t>
-            </a:fld>
-            <a:endParaRPr b="0" lang="es-ES" sz="1200" spc="-1" strike="noStrike">
-              <a:latin typeface="Times New Roman"/>
+            <a:r>
+              <a:rPr b="0" lang="es-ES" sz="2000" spc="-1" strike="noStrike">
+                <a:latin typeface="Arial"/>
+              </a:rPr>
+              <a:t>Séptimo nivel del esquema</a:t>
+            </a:r>
+            <a:endParaRPr b="0" lang="es-ES" sz="2000" spc="-1" strike="noStrike">
+              <a:latin typeface="Arial"/>
             </a:endParaRPr>
           </a:p>
         </p:txBody>
@@ -1830,7 +1880,7 @@
       </p:grpSpPr>
       <p:pic>
         <p:nvPicPr>
-          <p:cNvPr id="41" name="Picture 13" descr=""/>
+          <p:cNvPr id="38" name="" descr=""/>
           <p:cNvPicPr/>
           <p:nvPr/>
         </p:nvPicPr>
@@ -1840,8 +1890,118 @@
         </p:blipFill>
         <p:spPr>
           <a:xfrm>
+            <a:off x="2935080" y="144000"/>
+            <a:ext cx="3472920" cy="3472920"/>
+          </a:xfrm>
+          <a:prstGeom prst="rect">
+            <a:avLst/>
+          </a:prstGeom>
+          <a:ln>
+            <a:noFill/>
+          </a:ln>
+        </p:spPr>
+      </p:pic>
+      <p:sp>
+        <p:nvSpPr>
+          <p:cNvPr id="39" name="TextShape 1"/>
+          <p:cNvSpPr txBox="1"/>
+          <p:nvPr/>
+        </p:nvSpPr>
+        <p:spPr>
+          <a:xfrm>
+            <a:off x="648000" y="3816000"/>
+            <a:ext cx="7992000" cy="1395000"/>
+          </a:xfrm>
+          <a:prstGeom prst="rect">
+            <a:avLst/>
+          </a:prstGeom>
+          <a:noFill/>
+          <a:ln>
+            <a:noFill/>
+          </a:ln>
+        </p:spPr>
+        <p:txBody>
+          <a:bodyPr lIns="90000" rIns="90000" tIns="45000" bIns="45000"/>
+          <a:p>
+            <a:pPr algn="ctr"/>
+            <a:r>
+              <a:rPr b="1" lang="es-ES" sz="4000" spc="-1" strike="noStrike">
+                <a:latin typeface="Arial"/>
+              </a:rPr>
+              <a:t>TU VOTO CUENTA</a:t>
+            </a:r>
+            <a:endParaRPr b="0" lang="es-ES" sz="4000" spc="-1" strike="noStrike">
+              <a:latin typeface="Arial"/>
+            </a:endParaRPr>
+          </a:p>
+          <a:p>
+            <a:pPr algn="ctr"/>
+            <a:r>
+              <a:rPr b="0" lang="es-ES" sz="1600" spc="-1" strike="noStrike">
+                <a:latin typeface="Arial"/>
+              </a:rPr>
+              <a:t>Modelo CANVAS – Empresa e Iniciativa Emprendedora</a:t>
+            </a:r>
+            <a:endParaRPr b="0" lang="es-ES" sz="1600" spc="-1" strike="noStrike">
+              <a:latin typeface="Arial"/>
+            </a:endParaRPr>
+          </a:p>
+          <a:p>
+            <a:pPr algn="ctr"/>
+            <a:endParaRPr b="0" lang="es-ES" sz="1600" spc="-1" strike="noStrike">
+              <a:latin typeface="Arial"/>
+            </a:endParaRPr>
+          </a:p>
+          <a:p>
+            <a:pPr algn="ctr"/>
+            <a:r>
+              <a:rPr b="0" lang="es-ES" sz="1800" spc="-1" strike="noStrike">
+                <a:latin typeface="Arial"/>
+              </a:rPr>
+              <a:t>JOSÉ ALBERTO VÁZQUEZ LÓPEZ </a:t>
+            </a:r>
+            <a:endParaRPr b="0" lang="es-ES" sz="1800" spc="-1" strike="noStrike">
+              <a:latin typeface="Arial"/>
+            </a:endParaRPr>
+          </a:p>
+        </p:txBody>
+      </p:sp>
+    </p:spTree>
+  </p:cSld>
+</p:sld>
+</file>
+
+<file path=ppt/slides/slide2.xml><?xml version="1.0" encoding="utf-8"?>
+<p:sld xmlns:a="http://schemas.openxmlformats.org/drawingml/2006/main" xmlns:p="http://schemas.openxmlformats.org/presentationml/2006/main" xmlns:r="http://schemas.openxmlformats.org/officeDocument/2006/relationships" xmlns:p14="http://schemas.microsoft.com/office/powerpoint/2010/main" xmlns:p15="http://schemas.microsoft.com/office/powerpoint/2012/main" xmlns:mc="http://schemas.openxmlformats.org/markup-compatibility/2006">
+  <p:cSld>
+    <p:spTree>
+      <p:nvGrpSpPr>
+        <p:cNvPr id="1" name=""/>
+        <p:cNvGrpSpPr/>
+        <p:nvPr/>
+      </p:nvGrpSpPr>
+      <p:grpSpPr>
+        <a:xfrm>
+          <a:off x="0" y="0"/>
+          <a:ext cx="0" cy="0"/>
+          <a:chOff x="0" y="0"/>
+          <a:chExt cx="0" cy="0"/>
+        </a:xfrm>
+      </p:grpSpPr>
+      <p:pic>
+        <p:nvPicPr>
+          <p:cNvPr id="40" name="Picture 13" descr=""/>
+          <p:cNvPicPr/>
+          <p:nvPr/>
+        </p:nvPicPr>
+        <p:blipFill>
+          <a:blip r:embed="rId1"/>
+          <a:stretch/>
+        </p:blipFill>
+        <p:spPr>
+          <a:xfrm>
             <a:off x="7191360" y="469800"/>
-            <a:ext cx="561600" cy="672840"/>
+            <a:ext cx="561240" cy="672480"/>
           </a:xfrm>
           <a:prstGeom prst="rect">
             <a:avLst/>
@@ -1853,7 +2013,7 @@
       </p:pic>
       <p:pic>
         <p:nvPicPr>
-          <p:cNvPr id="42" name="Picture 14" descr=""/>
+          <p:cNvPr id="41" name="Picture 14" descr=""/>
           <p:cNvPicPr/>
           <p:nvPr/>
         </p:nvPicPr>
@@ -1864,7 +2024,7 @@
         <p:spPr>
           <a:xfrm>
             <a:off x="3701880" y="412920"/>
-            <a:ext cx="507600" cy="529920"/>
+            <a:ext cx="507240" cy="529560"/>
           </a:xfrm>
           <a:prstGeom prst="rect">
             <a:avLst/>
@@ -1876,7 +2036,7 @@
       </p:pic>
       <p:pic>
         <p:nvPicPr>
-          <p:cNvPr id="43" name="Picture 15" descr=""/>
+          <p:cNvPr id="42" name="Picture 15" descr=""/>
           <p:cNvPicPr/>
           <p:nvPr/>
         </p:nvPicPr>
@@ -1887,7 +2047,7 @@
         <p:spPr>
           <a:xfrm>
             <a:off x="5500800" y="2854440"/>
-            <a:ext cx="498240" cy="514080"/>
+            <a:ext cx="497880" cy="513720"/>
           </a:xfrm>
           <a:prstGeom prst="rect">
             <a:avLst/>
@@ -1899,7 +2059,7 @@
       </p:pic>
       <p:pic>
         <p:nvPicPr>
-          <p:cNvPr id="44" name="Picture 16" descr=""/>
+          <p:cNvPr id="43" name="Picture 16" descr=""/>
           <p:cNvPicPr/>
           <p:nvPr/>
         </p:nvPicPr>
@@ -1910,7 +2070,7 @@
         <p:spPr>
           <a:xfrm>
             <a:off x="5381640" y="349200"/>
-            <a:ext cx="558360" cy="572760"/>
+            <a:ext cx="558000" cy="572400"/>
           </a:xfrm>
           <a:prstGeom prst="rect">
             <a:avLst/>
@@ -1922,7 +2082,7 @@
       </p:pic>
       <p:pic>
         <p:nvPicPr>
-          <p:cNvPr id="45" name="Picture 17" descr=""/>
+          <p:cNvPr id="44" name="Picture 17" descr=""/>
           <p:cNvPicPr/>
           <p:nvPr/>
         </p:nvPicPr>
@@ -1934,7 +2094,7 @@
         <p:spPr>
           <a:xfrm>
             <a:off x="4633920" y="5446800"/>
-            <a:ext cx="452160" cy="572760"/>
+            <a:ext cx="451800" cy="572400"/>
           </a:xfrm>
           <a:prstGeom prst="rect">
             <a:avLst/>
@@ -1946,7 +2106,7 @@
       </p:pic>
       <p:pic>
         <p:nvPicPr>
-          <p:cNvPr id="46" name="Picture 18" descr=""/>
+          <p:cNvPr id="45" name="Picture 18" descr=""/>
           <p:cNvPicPr/>
           <p:nvPr/>
         </p:nvPicPr>
@@ -1958,7 +2118,7 @@
         <p:spPr>
           <a:xfrm>
             <a:off x="1919160" y="2949480"/>
-            <a:ext cx="671400" cy="593280"/>
+            <a:ext cx="671040" cy="592920"/>
           </a:xfrm>
           <a:prstGeom prst="rect">
             <a:avLst/>
@@ -1970,7 +2130,7 @@
       </p:pic>
       <p:pic>
         <p:nvPicPr>
-          <p:cNvPr id="47" name="Picture 19" descr=""/>
+          <p:cNvPr id="46" name="Picture 19" descr=""/>
           <p:cNvPicPr/>
           <p:nvPr/>
         </p:nvPicPr>
@@ -1981,7 +2141,7 @@
         <p:spPr>
           <a:xfrm>
             <a:off x="1778760" y="361800"/>
-            <a:ext cx="766440" cy="719640"/>
+            <a:ext cx="766080" cy="719280"/>
           </a:xfrm>
           <a:prstGeom prst="rect">
             <a:avLst/>
@@ -1993,7 +2153,7 @@
       </p:pic>
       <p:pic>
         <p:nvPicPr>
-          <p:cNvPr id="48" name="Picture 20" descr=""/>
+          <p:cNvPr id="47" name="Picture 20" descr=""/>
           <p:cNvPicPr/>
           <p:nvPr/>
         </p:nvPicPr>
@@ -2004,7 +2164,7 @@
         <p:spPr>
           <a:xfrm>
             <a:off x="120600" y="384120"/>
-            <a:ext cx="479160" cy="493200"/>
+            <a:ext cx="478800" cy="492840"/>
           </a:xfrm>
           <a:prstGeom prst="rect">
             <a:avLst/>
@@ -2016,7 +2176,7 @@
       </p:pic>
       <p:pic>
         <p:nvPicPr>
-          <p:cNvPr id="49" name="Picture 21" descr=""/>
+          <p:cNvPr id="48" name="Picture 21" descr=""/>
           <p:cNvPicPr/>
           <p:nvPr/>
         </p:nvPicPr>
@@ -2028,7 +2188,7 @@
         <p:spPr>
           <a:xfrm>
             <a:off x="138240" y="5454720"/>
-            <a:ext cx="534600" cy="515520"/>
+            <a:ext cx="534240" cy="515160"/>
           </a:xfrm>
           <a:prstGeom prst="rect">
             <a:avLst/>
@@ -2040,27 +2200,27 @@
       </p:pic>
       <p:graphicFrame>
         <p:nvGraphicFramePr>
-          <p:cNvPr id="50" name="Table 1"/>
+          <p:cNvPr id="49" name="Table 1"/>
           <p:cNvGraphicFramePr/>
           <p:nvPr/>
         </p:nvGraphicFramePr>
         <p:xfrm>
-          <a:off x="152280" y="457200"/>
-          <a:ext cx="8838720" cy="6396480"/>
+          <a:off x="37440" y="-1440"/>
+          <a:ext cx="9106200" cy="8065440"/>
         </p:xfrm>
         <a:graphic>
           <a:graphicData uri="http://schemas.openxmlformats.org/drawingml/2006/table">
             <a:tbl>
               <a:tblPr/>
               <a:tblGrid>
-                <a:gridCol w="1767600"/>
-                <a:gridCol w="1767600"/>
-                <a:gridCol w="883800"/>
-                <a:gridCol w="883800"/>
-                <a:gridCol w="1767600"/>
-                <a:gridCol w="1768320"/>
+                <a:gridCol w="1780560"/>
+                <a:gridCol w="1817640"/>
+                <a:gridCol w="853920"/>
+                <a:gridCol w="890280"/>
+                <a:gridCol w="1780560"/>
+                <a:gridCol w="1983600"/>
               </a:tblGrid>
-              <a:tr h="2680560">
+              <a:tr h="2499120">
                 <a:tc rowSpan="2">
                   <a:txBody>
                     <a:bodyPr lIns="82080" rIns="82080"/>
@@ -2142,7 +2302,7 @@
                       </a:endParaRPr>
                     </a:p>
                     <a:p>
-                      <a:pPr marL="171360" indent="-171000">
+                      <a:pPr marL="171360" indent="-170640">
                         <a:lnSpc>
                           <a:spcPct val="100000"/>
                         </a:lnSpc>
@@ -2166,7 +2326,7 @@
                       </a:endParaRPr>
                     </a:p>
                     <a:p>
-                      <a:pPr marL="171360" indent="-171000">
+                      <a:pPr marL="171360" indent="-170640">
                         <a:lnSpc>
                           <a:spcPct val="100000"/>
                         </a:lnSpc>
@@ -2190,7 +2350,7 @@
                       </a:endParaRPr>
                     </a:p>
                     <a:p>
-                      <a:pPr marL="171360" indent="-171000">
+                      <a:pPr marL="171360" indent="-170640">
                         <a:lnSpc>
                           <a:spcPct val="100000"/>
                         </a:lnSpc>
@@ -2214,7 +2374,7 @@
                       </a:endParaRPr>
                     </a:p>
                     <a:p>
-                      <a:pPr marL="171360" indent="-171000">
+                      <a:pPr marL="171360" indent="-170640">
                         <a:lnSpc>
                           <a:spcPct val="100000"/>
                         </a:lnSpc>
@@ -2238,7 +2398,7 @@
                       </a:endParaRPr>
                     </a:p>
                     <a:p>
-                      <a:pPr marL="171360" indent="-171000">
+                      <a:pPr marL="171360" indent="-170640">
                         <a:lnSpc>
                           <a:spcPct val="100000"/>
                         </a:lnSpc>
@@ -2262,7 +2422,7 @@
                       </a:endParaRPr>
                     </a:p>
                     <a:p>
-                      <a:pPr marL="171360" indent="-171000">
+                      <a:pPr marL="171360" indent="-170640">
                         <a:lnSpc>
                           <a:spcPct val="100000"/>
                         </a:lnSpc>
@@ -2286,7 +2446,7 @@
                       </a:endParaRPr>
                     </a:p>
                     <a:p>
-                      <a:pPr marL="171360" indent="-171000">
+                      <a:pPr marL="171360" indent="-170640">
                         <a:lnSpc>
                           <a:spcPct val="100000"/>
                         </a:lnSpc>
@@ -2304,6 +2464,74 @@
                           <a:latin typeface="Arial Narrow"/>
                         </a:rPr>
                         <a:t>Community Mánagers</a:t>
+                      </a:r>
+                      <a:endParaRPr b="0" lang="es-ES" sz="1400" spc="-1" strike="noStrike">
+                        <a:latin typeface="Arial"/>
+                      </a:endParaRPr>
+                    </a:p>
+                    <a:p>
+                      <a:pPr marL="171360" indent="-170640">
+                        <a:lnSpc>
+                          <a:spcPct val="100000"/>
+                        </a:lnSpc>
+                        <a:buClr>
+                          <a:srgbClr val="000000"/>
+                        </a:buClr>
+                        <a:buFont typeface="Arial"/>
+                        <a:buChar char="•"/>
+                      </a:pPr>
+                      <a:endParaRPr b="0" lang="es-ES" sz="1400" spc="-1" strike="noStrike">
+                        <a:latin typeface="Arial"/>
+                      </a:endParaRPr>
+                    </a:p>
+                    <a:p>
+                      <a:pPr marL="171360" indent="-170640">
+                        <a:lnSpc>
+                          <a:spcPct val="100000"/>
+                        </a:lnSpc>
+                        <a:buClr>
+                          <a:srgbClr val="000000"/>
+                        </a:buClr>
+                        <a:buFont typeface="Arial"/>
+                        <a:buChar char="•"/>
+                      </a:pPr>
+                      <a:r>
+                        <a:rPr b="1" lang="es-ES" sz="1200" spc="-1" strike="noStrike">
+                          <a:solidFill>
+                            <a:srgbClr val="000000"/>
+                          </a:solidFill>
+                          <a:latin typeface="Calibri"/>
+                        </a:rPr>
+                        <a:t>Cost Structure</a:t>
+                      </a:r>
+                      <a:endParaRPr b="0" lang="es-ES" sz="1200" spc="-1" strike="noStrike">
+                        <a:latin typeface="Arial"/>
+                      </a:endParaRPr>
+                    </a:p>
+                    <a:p>
+                      <a:pPr>
+                        <a:lnSpc>
+                          <a:spcPct val="100000"/>
+                        </a:lnSpc>
+                      </a:pPr>
+                      <a:endParaRPr b="0" lang="es-ES" sz="1200" spc="-1" strike="noStrike">
+                        <a:latin typeface="Arial"/>
+                      </a:endParaRPr>
+                    </a:p>
+                    <a:p>
+                      <a:pPr>
+                        <a:lnSpc>
+                          <a:spcPct val="100000"/>
+                        </a:lnSpc>
+                      </a:pPr>
+                      <a:r>
+                        <a:rPr b="0" lang="es-ES" sz="1400" spc="-1" strike="noStrike">
+                          <a:solidFill>
+                            <a:srgbClr val="000000"/>
+                          </a:solidFill>
+                          <a:latin typeface="Arial Narrow"/>
+                        </a:rPr>
+                        <a:t>La estructura de costes será siguiendo el modelo “Mercadona”, es decir, lo que se gana de los clientes (publicidad)                  se realiza antes que pagar a los proveedores (host, servidores, mantenimiento, y por último trabajadores).</a:t>
                       </a:r>
                       <a:endParaRPr b="0" lang="es-ES" sz="1400" spc="-1" strike="noStrike">
                         <a:latin typeface="Arial"/>
@@ -2405,7 +2633,7 @@
                       </a:endParaRPr>
                     </a:p>
                     <a:p>
-                      <a:pPr marL="171360" indent="-171000" algn="just">
+                      <a:pPr marL="171360" indent="-170640" algn="just">
                         <a:lnSpc>
                           <a:spcPct val="100000"/>
                         </a:lnSpc>
@@ -2439,7 +2667,7 @@
                       </a:endParaRPr>
                     </a:p>
                     <a:p>
-                      <a:pPr marL="171360" indent="-171000" algn="just">
+                      <a:pPr marL="171360" indent="-170640" algn="just">
                         <a:lnSpc>
                           <a:spcPct val="100000"/>
                         </a:lnSpc>
@@ -2551,16 +2779,7 @@
                           </a:solidFill>
                           <a:latin typeface="Arial Narrow"/>
                         </a:rPr>
-                        <a:t>¿Por qué nuestra empresa será</a:t>
-                      </a:r>
-                      <a:r>
-                        <a:rPr b="0" lang="es-ES" sz="1200" spc="-1" strike="noStrike">
-                          <a:solidFill>
-                            <a:srgbClr val="000000"/>
-                          </a:solidFill>
-                          <a:latin typeface="Arial Narrow"/>
-                        </a:rPr>
-                        <a:t> apta para que muchos clientes estén interesados en nosotros y por tanto la publicidad sea rentable en nuestra app?</a:t>
+                        <a:t>¿Por qué nuestra empresa será apta para que muchos clientes estén interesados en nosotros y por tanto la publicidad sea rentable en nuestra app?</a:t>
                       </a:r>
                       <a:endParaRPr b="0" lang="es-ES" sz="1200" spc="-1" strike="noStrike">
                         <a:latin typeface="Arial"/>
@@ -2831,7 +3050,7 @@
                       </a:endParaRPr>
                     </a:p>
                     <a:p>
-                      <a:pPr marL="171360" indent="-171000" algn="just">
+                      <a:pPr marL="171360" indent="-170640" algn="just">
                         <a:lnSpc>
                           <a:spcPct val="100000"/>
                         </a:lnSpc>
@@ -2855,7 +3074,7 @@
                       </a:endParaRPr>
                     </a:p>
                     <a:p>
-                      <a:pPr marL="171360" indent="-171000" algn="just">
+                      <a:pPr marL="171360" indent="-170640" algn="just">
                         <a:lnSpc>
                           <a:spcPct val="100000"/>
                         </a:lnSpc>
@@ -2879,7 +3098,7 @@
                       </a:endParaRPr>
                     </a:p>
                     <a:p>
-                      <a:pPr marL="171360" indent="-171000" algn="just">
+                      <a:pPr marL="171360" indent="-170640" algn="just">
                         <a:lnSpc>
                           <a:spcPct val="100000"/>
                         </a:lnSpc>
@@ -2903,7 +3122,7 @@
                       </a:endParaRPr>
                     </a:p>
                     <a:p>
-                      <a:pPr marL="171360" indent="-171000" algn="just">
+                      <a:pPr marL="171360" indent="-170640" algn="just">
                         <a:lnSpc>
                           <a:spcPct val="100000"/>
                         </a:lnSpc>
@@ -2927,7 +3146,7 @@
                       </a:endParaRPr>
                     </a:p>
                     <a:p>
-                      <a:pPr marL="171360" indent="-171000" algn="just">
+                      <a:pPr marL="171360" indent="-170640" algn="just">
                         <a:lnSpc>
                           <a:spcPct val="100000"/>
                         </a:lnSpc>
@@ -2990,7 +3209,7 @@
                       </a:endParaRPr>
                     </a:p>
                     <a:p>
-                      <a:pPr marL="171360" indent="-171000" algn="just">
+                      <a:pPr marL="171360" indent="-170640" algn="just">
                         <a:lnSpc>
                           <a:spcPct val="100000"/>
                         </a:lnSpc>
@@ -3014,7 +3233,7 @@
                       </a:endParaRPr>
                     </a:p>
                     <a:p>
-                      <a:pPr marL="171360" indent="-171000" algn="just">
+                      <a:pPr marL="171360" indent="-170640" algn="just">
                         <a:lnSpc>
                           <a:spcPct val="100000"/>
                         </a:lnSpc>
@@ -3032,6 +3251,83 @@
                           <a:latin typeface="Arial Narrow"/>
                         </a:rPr>
                         <a:t>Periodistas, medios de comunicación</a:t>
+                      </a:r>
+                      <a:endParaRPr b="0" lang="es-ES" sz="1200" spc="-1" strike="noStrike">
+                        <a:latin typeface="Arial"/>
+                      </a:endParaRPr>
+                    </a:p>
+                    <a:p>
+                      <a:pPr>
+                        <a:lnSpc>
+                          <a:spcPct val="100000"/>
+                        </a:lnSpc>
+                      </a:pPr>
+                      <a:r>
+                        <a:rPr b="1" lang="es-ES" sz="1200" spc="-1" strike="noStrike">
+                          <a:solidFill>
+                            <a:srgbClr val="000000"/>
+                          </a:solidFill>
+                          <a:latin typeface="Calibri"/>
+                        </a:rPr>
+                        <a:t> </a:t>
+                      </a:r>
+                      <a:endParaRPr b="0" lang="es-ES" sz="1200" spc="-1" strike="noStrike">
+                        <a:latin typeface="Arial"/>
+                      </a:endParaRPr>
+                    </a:p>
+                    <a:p>
+                      <a:pPr>
+                        <a:lnSpc>
+                          <a:spcPct val="100000"/>
+                        </a:lnSpc>
+                      </a:pPr>
+                      <a:endParaRPr b="0" lang="es-ES" sz="1200" spc="-1" strike="noStrike">
+                        <a:latin typeface="Arial"/>
+                      </a:endParaRPr>
+                    </a:p>
+                    <a:p>
+                      <a:pPr>
+                        <a:lnSpc>
+                          <a:spcPct val="100000"/>
+                        </a:lnSpc>
+                      </a:pPr>
+                      <a:r>
+                        <a:rPr b="1" lang="es-ES" sz="1200" spc="-1" strike="noStrike">
+                          <a:solidFill>
+                            <a:srgbClr val="000000"/>
+                          </a:solidFill>
+                          <a:latin typeface="Calibri"/>
+                        </a:rPr>
+                        <a:t>Revenue Streams</a:t>
+                      </a:r>
+                      <a:endParaRPr b="0" lang="es-ES" sz="1200" spc="-1" strike="noStrike">
+                        <a:latin typeface="Arial"/>
+                      </a:endParaRPr>
+                    </a:p>
+                    <a:p>
+                      <a:pPr>
+                        <a:lnSpc>
+                          <a:spcPct val="100000"/>
+                        </a:lnSpc>
+                      </a:pPr>
+                      <a:endParaRPr b="0" lang="es-ES" sz="1200" spc="-1" strike="noStrike">
+                        <a:latin typeface="Arial"/>
+                      </a:endParaRPr>
+                    </a:p>
+                    <a:p>
+                      <a:pPr algn="just">
+                        <a:lnSpc>
+                          <a:spcPct val="100000"/>
+                        </a:lnSpc>
+                      </a:pPr>
+                      <a:r>
+                        <a:rPr b="0" lang="es-ES" sz="1200" spc="-1" strike="noStrike">
+                          <a:solidFill>
+                            <a:srgbClr val="000000"/>
+                          </a:solidFill>
+                          <a:latin typeface="Arial Narrow"/>
+                        </a:rPr>
+                        <a:t>Nuestra fuente de ingresos será en mayor medida gracias a la publicidad que se encontrará en la plataforma, mediante cuentas freemium que permitan la aparición de banners. También existirán subvenciones y ayudas al emprendedor</a:t>
                       </a:r>
                       <a:endParaRPr b="0" lang="es-ES" sz="1200" spc="-1" strike="noStrike">
                         <a:latin typeface="Arial"/>
@@ -3063,7 +3359,7 @@
                   </a:tcPr>
                 </a:tc>
               </a:tr>
-              <a:tr h="4487760">
+              <a:tr h="4467240">
                 <a:tc vMerge="1">
                   <a:tcPr>
                     <a:solidFill>
@@ -3123,7 +3419,7 @@
                       </a:endParaRPr>
                     </a:p>
                     <a:p>
-                      <a:pPr marL="171360" indent="-171000" algn="just">
+                      <a:pPr marL="171360" indent="-170640" algn="just">
                         <a:lnSpc>
                           <a:spcPct val="100000"/>
                         </a:lnSpc>
@@ -3147,7 +3443,7 @@
                       </a:endParaRPr>
                     </a:p>
                     <a:p>
-                      <a:pPr marL="171360" indent="-171000" algn="just">
+                      <a:pPr marL="171360" indent="-170640" algn="just">
                         <a:lnSpc>
                           <a:spcPct val="100000"/>
                         </a:lnSpc>
@@ -3341,7 +3637,7 @@
                   </a:tcPr>
                 </a:tc>
               </a:tr>
-              <a:tr h="1428480">
+              <a:tr h="1457280">
                 <a:tc gridSpan="3">
                   <a:txBody>
                     <a:bodyPr lIns="82080" rIns="82080"/>
@@ -3358,16 +3654,7 @@
                           </a:solidFill>
                           <a:latin typeface="Calibri"/>
                         </a:rPr>
-                        <a:t>              </a:t>
-                      </a:r>
-                      <a:r>
-                        <a:rPr b="1" lang="es-ES" sz="1200" spc="-1" strike="noStrike">
-                          <a:solidFill>
-                            <a:srgbClr val="000000"/>
-                          </a:solidFill>
-                          <a:latin typeface="Calibri"/>
-                        </a:rPr>
-                        <a:t>Cost Structure</a:t>
+                        <a:t>    </a:t>
                       </a:r>
                       <a:endParaRPr b="0" lang="es-ES" sz="1200" spc="-1" strike="noStrike">
                         <a:latin typeface="Arial"/>
@@ -3380,35 +3667,6 @@
                         </a:lnSpc>
                       </a:pPr>
                       <a:endParaRPr b="0" lang="es-ES" sz="1200" spc="-1" strike="noStrike">
-                        <a:latin typeface="Arial"/>
-                      </a:endParaRPr>
-                    </a:p>
-                    <a:p>
-                      <a:pPr algn="just">
-                        <a:lnSpc>
-                          <a:spcPct val="100000"/>
-                        </a:lnSpc>
-                      </a:pPr>
-                      <a:r>
-                        <a:rPr b="0" lang="es-ES" sz="1400" spc="-1" strike="noStrike">
-                          <a:solidFill>
-                            <a:srgbClr val="000000"/>
-                          </a:solidFill>
-                          <a:latin typeface="Arial Narrow"/>
-                        </a:rPr>
-                        <a:t>La estructura de costes será siguiendo el modelo “Mercadona”, es decir, lo que se gana de los clientes (publicidad) se realiza antes que pagar a los proveedores (host, servidores, mantenimiento, y por último trabajadores).</a:t>
-                      </a:r>
-                      <a:endParaRPr b="0" lang="es-ES" sz="1400" spc="-1" strike="noStrike">
-                        <a:latin typeface="Arial"/>
-                      </a:endParaRPr>
-                    </a:p>
-                    <a:p>
-                      <a:pPr>
-                        <a:lnSpc>
-                          <a:spcPct val="100000"/>
-                        </a:lnSpc>
-                      </a:pPr>
-                      <a:endParaRPr b="0" lang="es-ES" sz="1400" spc="-1" strike="noStrike">
                         <a:latin typeface="Arial"/>
                       </a:endParaRPr>
                     </a:p>
@@ -3635,6 +3893,45 @@
           </a:graphicData>
         </a:graphic>
       </p:graphicFrame>
+      <p:sp>
+        <p:nvSpPr>
+          <p:cNvPr id="50" name="TextShape 2"/>
+          <p:cNvSpPr txBox="1"/>
+          <p:nvPr/>
+        </p:nvSpPr>
+        <p:spPr>
+          <a:xfrm>
+            <a:off x="3096000" y="7262640"/>
+            <a:ext cx="2856960" cy="238680"/>
+          </a:xfrm>
+          <a:prstGeom prst="rect">
+            <a:avLst/>
+          </a:prstGeom>
+          <a:noFill/>
+          <a:ln>
+            <a:noFill/>
+          </a:ln>
+        </p:spPr>
+        <p:txBody>
+          <a:bodyPr lIns="90000" rIns="90000" tIns="45000" bIns="45000"/>
+          <a:p>
+            <a:r>
+              <a:rPr b="0" lang="es-ES" sz="1000" spc="-1" strike="noStrike" u="sng">
+                <a:solidFill>
+                  <a:srgbClr val="0000ff"/>
+                </a:solidFill>
+                <a:uFillTx/>
+                <a:latin typeface="Calibri"/>
+                <a:hlinkClick r:id="rId11"/>
+              </a:rPr>
+              <a:t>http://www.businessmodelgeneration.com</a:t>
+            </a:r>
+            <a:endParaRPr b="0" lang="es-ES" sz="1000" spc="-1" strike="noStrike">
+              <a:latin typeface="Arial"/>
+            </a:endParaRPr>
+          </a:p>
+        </p:txBody>
+      </p:sp>
     </p:spTree>
   </p:cSld>
   <p:timing>
@@ -3644,1667 +3941,6 @@
           <p:childTnLst>
             <p:seq>
               <p:cTn id="2" dur="indefinite" nodeType="mainSeq"/>
-              <p:prevCondLst>
-                <p:cond delay="0" evt="onPrev">
-                  <p:tgtEl>
-                    <p:sldTgt/>
-                  </p:tgtEl>
-                </p:cond>
-              </p:prevCondLst>
-              <p:nextCondLst>
-                <p:cond delay="0" evt="onNext">
-                  <p:tgtEl>
-                    <p:sldTgt/>
-                  </p:tgtEl>
-                </p:cond>
-              </p:nextCondLst>
-            </p:seq>
-          </p:childTnLst>
-        </p:cTn>
-      </p:par>
-    </p:tnLst>
-  </p:timing>
-</p:sld>
-</file>
-
-<file path=ppt/slides/slide2.xml><?xml version="1.0" encoding="utf-8"?>
-<p:sld xmlns:a="http://schemas.openxmlformats.org/drawingml/2006/main" xmlns:p="http://schemas.openxmlformats.org/presentationml/2006/main" xmlns:r="http://schemas.openxmlformats.org/officeDocument/2006/relationships" xmlns:p14="http://schemas.microsoft.com/office/powerpoint/2010/main" xmlns:p15="http://schemas.microsoft.com/office/powerpoint/2012/main" xmlns:mc="http://schemas.openxmlformats.org/markup-compatibility/2006">
-  <p:cSld>
-    <p:spTree>
-      <p:nvGrpSpPr>
-        <p:cNvPr id="1" name=""/>
-        <p:cNvGrpSpPr/>
-        <p:nvPr/>
-      </p:nvGrpSpPr>
-      <p:grpSpPr>
-        <a:xfrm>
-          <a:off x="0" y="0"/>
-          <a:ext cx="0" cy="0"/>
-          <a:chOff x="0" y="0"/>
-          <a:chExt cx="0" cy="0"/>
-        </a:xfrm>
-      </p:grpSpPr>
-      <p:pic>
-        <p:nvPicPr>
-          <p:cNvPr id="51" name="Picture 13" descr=""/>
-          <p:cNvPicPr/>
-          <p:nvPr/>
-        </p:nvPicPr>
-        <p:blipFill>
-          <a:blip r:embed="rId1"/>
-          <a:stretch/>
-        </p:blipFill>
-        <p:spPr>
-          <a:xfrm>
-            <a:off x="7191360" y="469800"/>
-            <a:ext cx="561600" cy="672840"/>
-          </a:xfrm>
-          <a:prstGeom prst="rect">
-            <a:avLst/>
-          </a:prstGeom>
-          <a:ln w="9360">
-            <a:noFill/>
-          </a:ln>
-        </p:spPr>
-      </p:pic>
-      <p:pic>
-        <p:nvPicPr>
-          <p:cNvPr id="52" name="Picture 14" descr=""/>
-          <p:cNvPicPr/>
-          <p:nvPr/>
-        </p:nvPicPr>
-        <p:blipFill>
-          <a:blip r:embed="rId2"/>
-          <a:stretch/>
-        </p:blipFill>
-        <p:spPr>
-          <a:xfrm>
-            <a:off x="3701880" y="412920"/>
-            <a:ext cx="507600" cy="529920"/>
-          </a:xfrm>
-          <a:prstGeom prst="rect">
-            <a:avLst/>
-          </a:prstGeom>
-          <a:ln w="9360">
-            <a:noFill/>
-          </a:ln>
-        </p:spPr>
-      </p:pic>
-      <p:pic>
-        <p:nvPicPr>
-          <p:cNvPr id="53" name="Picture 15" descr=""/>
-          <p:cNvPicPr/>
-          <p:nvPr/>
-        </p:nvPicPr>
-        <p:blipFill>
-          <a:blip r:embed="rId3"/>
-          <a:stretch/>
-        </p:blipFill>
-        <p:spPr>
-          <a:xfrm>
-            <a:off x="5500800" y="2390760"/>
-            <a:ext cx="498240" cy="514080"/>
-          </a:xfrm>
-          <a:prstGeom prst="rect">
-            <a:avLst/>
-          </a:prstGeom>
-          <a:ln w="9360">
-            <a:noFill/>
-          </a:ln>
-        </p:spPr>
-      </p:pic>
-      <p:pic>
-        <p:nvPicPr>
-          <p:cNvPr id="54" name="Picture 16" descr=""/>
-          <p:cNvPicPr/>
-          <p:nvPr/>
-        </p:nvPicPr>
-        <p:blipFill>
-          <a:blip r:embed="rId4"/>
-          <a:stretch/>
-        </p:blipFill>
-        <p:spPr>
-          <a:xfrm>
-            <a:off x="5381640" y="349200"/>
-            <a:ext cx="558360" cy="572760"/>
-          </a:xfrm>
-          <a:prstGeom prst="rect">
-            <a:avLst/>
-          </a:prstGeom>
-          <a:ln w="9360">
-            <a:noFill/>
-          </a:ln>
-        </p:spPr>
-      </p:pic>
-      <p:pic>
-        <p:nvPicPr>
-          <p:cNvPr id="55" name="Picture 17" descr=""/>
-          <p:cNvPicPr/>
-          <p:nvPr/>
-        </p:nvPicPr>
-        <p:blipFill>
-          <a:blip r:embed="rId5"/>
-          <a:srcRect l="11197" t="0" r="0" b="0"/>
-          <a:stretch/>
-        </p:blipFill>
-        <p:spPr>
-          <a:xfrm>
-            <a:off x="4633920" y="4514760"/>
-            <a:ext cx="452160" cy="572760"/>
-          </a:xfrm>
-          <a:prstGeom prst="rect">
-            <a:avLst/>
-          </a:prstGeom>
-          <a:ln w="9360">
-            <a:noFill/>
-          </a:ln>
-        </p:spPr>
-      </p:pic>
-      <p:pic>
-        <p:nvPicPr>
-          <p:cNvPr id="56" name="Picture 18" descr=""/>
-          <p:cNvPicPr/>
-          <p:nvPr/>
-        </p:nvPicPr>
-        <p:blipFill>
-          <a:blip r:embed="rId6"/>
-          <a:srcRect l="0" t="0" r="0" b="6738"/>
-          <a:stretch/>
-        </p:blipFill>
-        <p:spPr>
-          <a:xfrm>
-            <a:off x="1919160" y="2486160"/>
-            <a:ext cx="671400" cy="593280"/>
-          </a:xfrm>
-          <a:prstGeom prst="rect">
-            <a:avLst/>
-          </a:prstGeom>
-          <a:ln w="9360">
-            <a:noFill/>
-          </a:ln>
-        </p:spPr>
-      </p:pic>
-      <p:pic>
-        <p:nvPicPr>
-          <p:cNvPr id="57" name="Picture 19" descr=""/>
-          <p:cNvPicPr/>
-          <p:nvPr/>
-        </p:nvPicPr>
-        <p:blipFill>
-          <a:blip r:embed="rId7"/>
-          <a:stretch/>
-        </p:blipFill>
-        <p:spPr>
-          <a:xfrm>
-            <a:off x="1778760" y="361800"/>
-            <a:ext cx="766440" cy="719640"/>
-          </a:xfrm>
-          <a:prstGeom prst="rect">
-            <a:avLst/>
-          </a:prstGeom>
-          <a:ln w="9360">
-            <a:noFill/>
-          </a:ln>
-        </p:spPr>
-      </p:pic>
-      <p:pic>
-        <p:nvPicPr>
-          <p:cNvPr id="58" name="Picture 20" descr=""/>
-          <p:cNvPicPr/>
-          <p:nvPr/>
-        </p:nvPicPr>
-        <p:blipFill>
-          <a:blip r:embed="rId8"/>
-          <a:stretch/>
-        </p:blipFill>
-        <p:spPr>
-          <a:xfrm>
-            <a:off x="120600" y="384120"/>
-            <a:ext cx="479160" cy="493200"/>
-          </a:xfrm>
-          <a:prstGeom prst="rect">
-            <a:avLst/>
-          </a:prstGeom>
-          <a:ln w="9360">
-            <a:noFill/>
-          </a:ln>
-        </p:spPr>
-      </p:pic>
-      <p:pic>
-        <p:nvPicPr>
-          <p:cNvPr id="59" name="Picture 21" descr=""/>
-          <p:cNvPicPr/>
-          <p:nvPr/>
-        </p:nvPicPr>
-        <p:blipFill>
-          <a:blip r:embed="rId9"/>
-          <a:srcRect l="0" t="8023" r="6842" b="0"/>
-          <a:stretch/>
-        </p:blipFill>
-        <p:spPr>
-          <a:xfrm>
-            <a:off x="138240" y="4522680"/>
-            <a:ext cx="534600" cy="515520"/>
-          </a:xfrm>
-          <a:prstGeom prst="rect">
-            <a:avLst/>
-          </a:prstGeom>
-          <a:ln w="9360">
-            <a:noFill/>
-          </a:ln>
-        </p:spPr>
-      </p:pic>
-      <p:pic>
-        <p:nvPicPr>
-          <p:cNvPr id="60" name="Picture 220" descr=""/>
-          <p:cNvPicPr/>
-          <p:nvPr/>
-        </p:nvPicPr>
-        <p:blipFill>
-          <a:blip r:embed="rId10"/>
-          <a:stretch/>
-        </p:blipFill>
-        <p:spPr>
-          <a:xfrm>
-            <a:off x="162000" y="5743440"/>
-            <a:ext cx="410400" cy="451440"/>
-          </a:xfrm>
-          <a:prstGeom prst="rect">
-            <a:avLst/>
-          </a:prstGeom>
-          <a:ln>
-            <a:noFill/>
-          </a:ln>
-        </p:spPr>
-      </p:pic>
-      <p:pic>
-        <p:nvPicPr>
-          <p:cNvPr id="61" name="Picture 223" descr=""/>
-          <p:cNvPicPr/>
-          <p:nvPr/>
-        </p:nvPicPr>
-        <p:blipFill>
-          <a:blip r:embed="rId11"/>
-          <a:stretch/>
-        </p:blipFill>
-        <p:spPr>
-          <a:xfrm>
-            <a:off x="4600440" y="5734440"/>
-            <a:ext cx="456840" cy="513720"/>
-          </a:xfrm>
-          <a:prstGeom prst="rect">
-            <a:avLst/>
-          </a:prstGeom>
-          <a:ln>
-            <a:noFill/>
-          </a:ln>
-        </p:spPr>
-      </p:pic>
-      <p:sp>
-        <p:nvSpPr>
-          <p:cNvPr id="62" name="TextShape 1"/>
-          <p:cNvSpPr txBox="1"/>
-          <p:nvPr/>
-        </p:nvSpPr>
-        <p:spPr>
-          <a:xfrm>
-            <a:off x="152280" y="122400"/>
-            <a:ext cx="8838720" cy="258480"/>
-          </a:xfrm>
-          <a:prstGeom prst="rect">
-            <a:avLst/>
-          </a:prstGeom>
-          <a:noFill/>
-          <a:ln w="9360">
-            <a:noFill/>
-          </a:ln>
-        </p:spPr>
-        <p:txBody>
-          <a:bodyPr anchor="ctr"/>
-          <a:p>
-            <a:pPr>
-              <a:lnSpc>
-                <a:spcPct val="100000"/>
-              </a:lnSpc>
-            </a:pPr>
-            <a:r>
-              <a:rPr b="0" lang="en-US" sz="2000" spc="-1" strike="noStrike">
-                <a:solidFill>
-                  <a:srgbClr val="000000"/>
-                </a:solidFill>
-                <a:latin typeface="Calibri"/>
-              </a:rPr>
-              <a:t>Business Model Canvas - </a:t>
-            </a:r>
-            <a:endParaRPr b="0" lang="en-US" sz="2000" spc="-1" strike="noStrike">
-              <a:solidFill>
-                <a:srgbClr val="000000"/>
-              </a:solidFill>
-              <a:latin typeface="Arial"/>
-            </a:endParaRPr>
-          </a:p>
-        </p:txBody>
-      </p:sp>
-      <p:graphicFrame>
-        <p:nvGraphicFramePr>
-          <p:cNvPr id="63" name="Table 2"/>
-          <p:cNvGraphicFramePr/>
-          <p:nvPr/>
-        </p:nvGraphicFramePr>
-        <p:xfrm>
-          <a:off x="152280" y="457200"/>
-          <a:ext cx="8838720" cy="6376320"/>
-        </p:xfrm>
-        <a:graphic>
-          <a:graphicData uri="http://schemas.openxmlformats.org/drawingml/2006/table">
-            <a:tbl>
-              <a:tblPr/>
-              <a:tblGrid>
-                <a:gridCol w="1767600"/>
-                <a:gridCol w="1767600"/>
-                <a:gridCol w="883800"/>
-                <a:gridCol w="883800"/>
-                <a:gridCol w="1767600"/>
-                <a:gridCol w="1768320"/>
-              </a:tblGrid>
-              <a:tr h="1950120">
-                <a:tc rowSpan="2">
-                  <a:txBody>
-                    <a:bodyPr lIns="82080" rIns="82080"/>
-                    <a:p>
-                      <a:pPr>
-                        <a:lnSpc>
-                          <a:spcPct val="100000"/>
-                        </a:lnSpc>
-                      </a:pPr>
-                      <a:r>
-                        <a:rPr b="1" lang="es-ES" sz="1200" spc="-1" strike="noStrike">
-                          <a:solidFill>
-                            <a:srgbClr val="000000"/>
-                          </a:solidFill>
-                          <a:latin typeface="Calibri"/>
-                        </a:rPr>
-                        <a:t>           </a:t>
-                      </a:r>
-                      <a:r>
-                        <a:rPr b="1" lang="es-ES" sz="1200" spc="-1" strike="noStrike">
-                          <a:solidFill>
-                            <a:srgbClr val="000000"/>
-                          </a:solidFill>
-                          <a:latin typeface="Calibri"/>
-                        </a:rPr>
-                        <a:t>Key Partners</a:t>
-                      </a:r>
-                      <a:endParaRPr b="0" lang="es-ES" sz="1200" spc="-1" strike="noStrike">
-                        <a:latin typeface="Arial"/>
-                      </a:endParaRPr>
-                    </a:p>
-                    <a:p>
-                      <a:pPr>
-                        <a:lnSpc>
-                          <a:spcPct val="100000"/>
-                        </a:lnSpc>
-                      </a:pPr>
-                      <a:endParaRPr b="0" lang="es-ES" sz="1200" spc="-1" strike="noStrike">
-                        <a:latin typeface="Arial"/>
-                      </a:endParaRPr>
-                    </a:p>
-                    <a:p>
-                      <a:pPr>
-                        <a:lnSpc>
-                          <a:spcPct val="100000"/>
-                        </a:lnSpc>
-                      </a:pPr>
-                      <a:endParaRPr b="0" lang="es-ES" sz="1200" spc="-1" strike="noStrike">
-                        <a:latin typeface="Arial"/>
-                      </a:endParaRPr>
-                    </a:p>
-                    <a:p>
-                      <a:pPr>
-                        <a:lnSpc>
-                          <a:spcPct val="100000"/>
-                        </a:lnSpc>
-                      </a:pPr>
-                      <a:endParaRPr b="0" lang="es-ES" sz="1200" spc="-1" strike="noStrike">
-                        <a:latin typeface="Arial"/>
-                      </a:endParaRPr>
-                    </a:p>
-                  </a:txBody>
-                  <a:tcPr marL="82080" marR="82080">
-                    <a:lnL w="28080">
-                      <a:solidFill>
-                        <a:srgbClr val="000000"/>
-                      </a:solidFill>
-                    </a:lnL>
-                    <a:lnR w="28080">
-                      <a:solidFill>
-                        <a:srgbClr val="000000"/>
-                      </a:solidFill>
-                    </a:lnR>
-                    <a:lnT w="28080">
-                      <a:solidFill>
-                        <a:srgbClr val="000000"/>
-                      </a:solidFill>
-                    </a:lnT>
-                    <a:lnB w="28080">
-                      <a:solidFill>
-                        <a:srgbClr val="000000"/>
-                      </a:solidFill>
-                    </a:lnB>
-                    <a:noFill/>
-                  </a:tcPr>
-                </a:tc>
-                <a:tc>
-                  <a:txBody>
-                    <a:bodyPr lIns="82080" rIns="82080"/>
-                    <a:p>
-                      <a:pPr>
-                        <a:lnSpc>
-                          <a:spcPct val="100000"/>
-                        </a:lnSpc>
-                      </a:pPr>
-                      <a:r>
-                        <a:rPr b="1" lang="es-ES" sz="1200" spc="-1" strike="noStrike">
-                          <a:solidFill>
-                            <a:srgbClr val="000000"/>
-                          </a:solidFill>
-                          <a:latin typeface="Calibri"/>
-                        </a:rPr>
-                        <a:t>        </a:t>
-                      </a:r>
-                      <a:r>
-                        <a:rPr b="1" lang="es-ES" sz="1200" spc="-1" strike="noStrike">
-                          <a:solidFill>
-                            <a:srgbClr val="000000"/>
-                          </a:solidFill>
-                          <a:latin typeface="Calibri"/>
-                        </a:rPr>
-                        <a:t>Key Activities</a:t>
-                      </a:r>
-                      <a:endParaRPr b="0" lang="es-ES" sz="1200" spc="-1" strike="noStrike">
-                        <a:latin typeface="Arial"/>
-                      </a:endParaRPr>
-                    </a:p>
-                    <a:p>
-                      <a:pPr>
-                        <a:lnSpc>
-                          <a:spcPct val="100000"/>
-                        </a:lnSpc>
-                      </a:pPr>
-                      <a:endParaRPr b="0" lang="es-ES" sz="1200" spc="-1" strike="noStrike">
-                        <a:latin typeface="Arial"/>
-                      </a:endParaRPr>
-                    </a:p>
-                    <a:p>
-                      <a:pPr>
-                        <a:lnSpc>
-                          <a:spcPct val="100000"/>
-                        </a:lnSpc>
-                      </a:pPr>
-                      <a:endParaRPr b="0" lang="es-ES" sz="1200" spc="-1" strike="noStrike">
-                        <a:latin typeface="Arial"/>
-                      </a:endParaRPr>
-                    </a:p>
-                    <a:p>
-                      <a:pPr>
-                        <a:lnSpc>
-                          <a:spcPct val="100000"/>
-                        </a:lnSpc>
-                      </a:pPr>
-                      <a:endParaRPr b="0" lang="es-ES" sz="1200" spc="-1" strike="noStrike">
-                        <a:latin typeface="Arial"/>
-                      </a:endParaRPr>
-                    </a:p>
-                  </a:txBody>
-                  <a:tcPr marL="82080" marR="82080">
-                    <a:lnL w="28080">
-                      <a:solidFill>
-                        <a:srgbClr val="000000"/>
-                      </a:solidFill>
-                    </a:lnL>
-                    <a:lnR w="28080">
-                      <a:solidFill>
-                        <a:srgbClr val="000000"/>
-                      </a:solidFill>
-                    </a:lnR>
-                    <a:lnT w="28080">
-                      <a:solidFill>
-                        <a:srgbClr val="000000"/>
-                      </a:solidFill>
-                    </a:lnT>
-                    <a:lnB w="28080">
-                      <a:solidFill>
-                        <a:srgbClr val="000000"/>
-                      </a:solidFill>
-                    </a:lnB>
-                    <a:noFill/>
-                  </a:tcPr>
-                </a:tc>
-                <a:tc gridSpan="2" rowSpan="2">
-                  <a:txBody>
-                    <a:bodyPr lIns="82080" rIns="82080"/>
-                    <a:p>
-                      <a:pPr>
-                        <a:lnSpc>
-                          <a:spcPct val="100000"/>
-                        </a:lnSpc>
-                      </a:pPr>
-                      <a:r>
-                        <a:rPr b="1" lang="es-ES" sz="1200" spc="-1" strike="noStrike">
-                          <a:solidFill>
-                            <a:srgbClr val="000000"/>
-                          </a:solidFill>
-                          <a:latin typeface="Calibri"/>
-                        </a:rPr>
-                        <a:t>          </a:t>
-                      </a:r>
-                      <a:r>
-                        <a:rPr b="1" lang="es-ES" sz="1200" spc="-1" strike="noStrike">
-                          <a:solidFill>
-                            <a:srgbClr val="000000"/>
-                          </a:solidFill>
-                          <a:latin typeface="Calibri"/>
-                        </a:rPr>
-                        <a:t>Value Propositions</a:t>
-                      </a:r>
-                      <a:endParaRPr b="0" lang="es-ES" sz="1200" spc="-1" strike="noStrike">
-                        <a:latin typeface="Arial"/>
-                      </a:endParaRPr>
-                    </a:p>
-                    <a:p>
-                      <a:pPr>
-                        <a:lnSpc>
-                          <a:spcPct val="100000"/>
-                        </a:lnSpc>
-                      </a:pPr>
-                      <a:endParaRPr b="0" lang="es-ES" sz="1200" spc="-1" strike="noStrike">
-                        <a:latin typeface="Arial"/>
-                      </a:endParaRPr>
-                    </a:p>
-                    <a:p>
-                      <a:pPr>
-                        <a:lnSpc>
-                          <a:spcPct val="100000"/>
-                        </a:lnSpc>
-                      </a:pPr>
-                      <a:endParaRPr b="0" lang="es-ES" sz="1200" spc="-1" strike="noStrike">
-                        <a:latin typeface="Arial"/>
-                      </a:endParaRPr>
-                    </a:p>
-                    <a:p>
-                      <a:pPr>
-                        <a:lnSpc>
-                          <a:spcPct val="100000"/>
-                        </a:lnSpc>
-                      </a:pPr>
-                      <a:endParaRPr b="0" lang="es-ES" sz="1200" spc="-1" strike="noStrike">
-                        <a:latin typeface="Arial"/>
-                      </a:endParaRPr>
-                    </a:p>
-                  </a:txBody>
-                  <a:tcPr marL="82080" marR="82080">
-                    <a:lnL w="28080">
-                      <a:solidFill>
-                        <a:srgbClr val="000000"/>
-                      </a:solidFill>
-                    </a:lnL>
-                    <a:lnR w="28080">
-                      <a:solidFill>
-                        <a:srgbClr val="000000"/>
-                      </a:solidFill>
-                    </a:lnR>
-                    <a:lnT w="28080">
-                      <a:solidFill>
-                        <a:srgbClr val="000000"/>
-                      </a:solidFill>
-                    </a:lnT>
-                    <a:lnB w="28080">
-                      <a:solidFill>
-                        <a:srgbClr val="000000"/>
-                      </a:solidFill>
-                    </a:lnB>
-                    <a:noFill/>
-                  </a:tcPr>
-                </a:tc>
-                <a:tc hMerge="1" rowSpan="1">
-                  <a:tcPr>
-                    <a:solidFill>
-                      <a:srgbClr val="729fcf"/>
-                    </a:solidFill>
-                  </a:tcPr>
-                </a:tc>
-                <a:tc>
-                  <a:txBody>
-                    <a:bodyPr lIns="82080" rIns="82080"/>
-                    <a:p>
-                      <a:pPr>
-                        <a:lnSpc>
-                          <a:spcPct val="100000"/>
-                        </a:lnSpc>
-                      </a:pPr>
-                      <a:r>
-                        <a:rPr b="1" lang="es-ES" sz="1200" spc="-1" strike="noStrike">
-                          <a:solidFill>
-                            <a:srgbClr val="000000"/>
-                          </a:solidFill>
-                          <a:latin typeface="Calibri"/>
-                        </a:rPr>
-                        <a:t>         </a:t>
-                      </a:r>
-                      <a:r>
-                        <a:rPr b="1" lang="es-ES" sz="1200" spc="-1" strike="noStrike">
-                          <a:solidFill>
-                            <a:srgbClr val="000000"/>
-                          </a:solidFill>
-                          <a:latin typeface="Calibri"/>
-                        </a:rPr>
-                        <a:t>Customer </a:t>
-                      </a:r>
-                      <a:endParaRPr b="0" lang="es-ES" sz="1200" spc="-1" strike="noStrike">
-                        <a:latin typeface="Arial"/>
-                      </a:endParaRPr>
-                    </a:p>
-                    <a:p>
-                      <a:pPr>
-                        <a:lnSpc>
-                          <a:spcPct val="100000"/>
-                        </a:lnSpc>
-                      </a:pPr>
-                      <a:r>
-                        <a:rPr b="1" lang="es-ES" sz="1200" spc="-1" strike="noStrike">
-                          <a:solidFill>
-                            <a:srgbClr val="000000"/>
-                          </a:solidFill>
-                          <a:latin typeface="Calibri"/>
-                        </a:rPr>
-                        <a:t>         </a:t>
-                      </a:r>
-                      <a:r>
-                        <a:rPr b="1" lang="es-ES" sz="1200" spc="-1" strike="noStrike">
-                          <a:solidFill>
-                            <a:srgbClr val="000000"/>
-                          </a:solidFill>
-                          <a:latin typeface="Calibri"/>
-                        </a:rPr>
-                        <a:t>Relationships</a:t>
-                      </a:r>
-                      <a:endParaRPr b="0" lang="es-ES" sz="1200" spc="-1" strike="noStrike">
-                        <a:latin typeface="Arial"/>
-                      </a:endParaRPr>
-                    </a:p>
-                    <a:p>
-                      <a:pPr>
-                        <a:lnSpc>
-                          <a:spcPct val="100000"/>
-                        </a:lnSpc>
-                      </a:pPr>
-                      <a:endParaRPr b="0" lang="es-ES" sz="1200" spc="-1" strike="noStrike">
-                        <a:latin typeface="Arial"/>
-                      </a:endParaRPr>
-                    </a:p>
-                    <a:p>
-                      <a:pPr>
-                        <a:lnSpc>
-                          <a:spcPct val="100000"/>
-                        </a:lnSpc>
-                      </a:pPr>
-                      <a:endParaRPr b="0" lang="es-ES" sz="1200" spc="-1" strike="noStrike">
-                        <a:latin typeface="Arial"/>
-                      </a:endParaRPr>
-                    </a:p>
-                  </a:txBody>
-                  <a:tcPr marL="82080" marR="82080">
-                    <a:lnL w="28080">
-                      <a:solidFill>
-                        <a:srgbClr val="000000"/>
-                      </a:solidFill>
-                    </a:lnL>
-                    <a:lnR w="28080">
-                      <a:solidFill>
-                        <a:srgbClr val="000000"/>
-                      </a:solidFill>
-                    </a:lnR>
-                    <a:lnT w="28080">
-                      <a:solidFill>
-                        <a:srgbClr val="000000"/>
-                      </a:solidFill>
-                    </a:lnT>
-                    <a:lnB w="28080">
-                      <a:solidFill>
-                        <a:srgbClr val="000000"/>
-                      </a:solidFill>
-                    </a:lnB>
-                    <a:noFill/>
-                  </a:tcPr>
-                </a:tc>
-                <a:tc rowSpan="2">
-                  <a:txBody>
-                    <a:bodyPr lIns="82080" rIns="82080"/>
-                    <a:p>
-                      <a:pPr>
-                        <a:lnSpc>
-                          <a:spcPct val="100000"/>
-                        </a:lnSpc>
-                      </a:pPr>
-                      <a:r>
-                        <a:rPr b="1" lang="es-ES" sz="1200" spc="-1" strike="noStrike">
-                          <a:solidFill>
-                            <a:srgbClr val="000000"/>
-                          </a:solidFill>
-                          <a:latin typeface="Calibri"/>
-                        </a:rPr>
-                        <a:t>      </a:t>
-                      </a:r>
-                      <a:r>
-                        <a:rPr b="1" lang="es-ES" sz="1200" spc="-1" strike="noStrike">
-                          <a:solidFill>
-                            <a:srgbClr val="000000"/>
-                          </a:solidFill>
-                          <a:latin typeface="Calibri"/>
-                        </a:rPr>
-                        <a:t>Customer Segments</a:t>
-                      </a:r>
-                      <a:endParaRPr b="0" lang="es-ES" sz="1200" spc="-1" strike="noStrike">
-                        <a:latin typeface="Arial"/>
-                      </a:endParaRPr>
-                    </a:p>
-                    <a:p>
-                      <a:pPr>
-                        <a:lnSpc>
-                          <a:spcPct val="100000"/>
-                        </a:lnSpc>
-                      </a:pPr>
-                      <a:endParaRPr b="0" lang="es-ES" sz="1200" spc="-1" strike="noStrike">
-                        <a:latin typeface="Arial"/>
-                      </a:endParaRPr>
-                    </a:p>
-                    <a:p>
-                      <a:pPr>
-                        <a:lnSpc>
-                          <a:spcPct val="100000"/>
-                        </a:lnSpc>
-                      </a:pPr>
-                      <a:endParaRPr b="0" lang="es-ES" sz="1200" spc="-1" strike="noStrike">
-                        <a:latin typeface="Arial"/>
-                      </a:endParaRPr>
-                    </a:p>
-                    <a:p>
-                      <a:pPr>
-                        <a:lnSpc>
-                          <a:spcPct val="100000"/>
-                        </a:lnSpc>
-                      </a:pPr>
-                      <a:endParaRPr b="0" lang="es-ES" sz="1200" spc="-1" strike="noStrike">
-                        <a:latin typeface="Arial"/>
-                      </a:endParaRPr>
-                    </a:p>
-                    <a:p>
-                      <a:pPr>
-                        <a:lnSpc>
-                          <a:spcPct val="100000"/>
-                        </a:lnSpc>
-                      </a:pPr>
-                      <a:endParaRPr b="0" lang="es-ES" sz="1200" spc="-1" strike="noStrike">
-                        <a:latin typeface="Arial"/>
-                      </a:endParaRPr>
-                    </a:p>
-                  </a:txBody>
-                  <a:tcPr marL="82080" marR="82080">
-                    <a:lnL w="28080">
-                      <a:solidFill>
-                        <a:srgbClr val="000000"/>
-                      </a:solidFill>
-                    </a:lnL>
-                    <a:lnR w="28080">
-                      <a:solidFill>
-                        <a:srgbClr val="000000"/>
-                      </a:solidFill>
-                    </a:lnR>
-                    <a:lnT w="28080">
-                      <a:solidFill>
-                        <a:srgbClr val="000000"/>
-                      </a:solidFill>
-                    </a:lnT>
-                    <a:lnB w="28080">
-                      <a:solidFill>
-                        <a:srgbClr val="000000"/>
-                      </a:solidFill>
-                    </a:lnB>
-                    <a:noFill/>
-                  </a:tcPr>
-                </a:tc>
-              </a:tr>
-              <a:tr h="1950120">
-                <a:tc vMerge="1">
-                  <a:tcPr>
-                    <a:solidFill>
-                      <a:srgbClr val="729fcf"/>
-                    </a:solidFill>
-                  </a:tcPr>
-                </a:tc>
-                <a:tc>
-                  <a:txBody>
-                    <a:bodyPr lIns="82080" rIns="82080"/>
-                    <a:p>
-                      <a:pPr>
-                        <a:lnSpc>
-                          <a:spcPct val="100000"/>
-                        </a:lnSpc>
-                      </a:pPr>
-                      <a:r>
-                        <a:rPr b="1" lang="es-ES" sz="1200" spc="-1" strike="noStrike">
-                          <a:solidFill>
-                            <a:srgbClr val="000000"/>
-                          </a:solidFill>
-                          <a:latin typeface="Calibri"/>
-                        </a:rPr>
-                        <a:t>             </a:t>
-                      </a:r>
-                      <a:r>
-                        <a:rPr b="1" lang="es-ES" sz="1200" spc="-1" strike="noStrike">
-                          <a:solidFill>
-                            <a:srgbClr val="000000"/>
-                          </a:solidFill>
-                          <a:latin typeface="Calibri"/>
-                        </a:rPr>
-                        <a:t>Key Resources</a:t>
-                      </a:r>
-                      <a:endParaRPr b="0" lang="es-ES" sz="1200" spc="-1" strike="noStrike">
-                        <a:latin typeface="Arial"/>
-                      </a:endParaRPr>
-                    </a:p>
-                    <a:p>
-                      <a:pPr>
-                        <a:lnSpc>
-                          <a:spcPct val="100000"/>
-                        </a:lnSpc>
-                      </a:pPr>
-                      <a:endParaRPr b="0" lang="es-ES" sz="1200" spc="-1" strike="noStrike">
-                        <a:latin typeface="Arial"/>
-                      </a:endParaRPr>
-                    </a:p>
-                    <a:p>
-                      <a:pPr>
-                        <a:lnSpc>
-                          <a:spcPct val="100000"/>
-                        </a:lnSpc>
-                      </a:pPr>
-                      <a:endParaRPr b="0" lang="es-ES" sz="1200" spc="-1" strike="noStrike">
-                        <a:latin typeface="Arial"/>
-                      </a:endParaRPr>
-                    </a:p>
-                    <a:p>
-                      <a:pPr>
-                        <a:lnSpc>
-                          <a:spcPct val="100000"/>
-                        </a:lnSpc>
-                      </a:pPr>
-                      <a:endParaRPr b="0" lang="es-ES" sz="1200" spc="-1" strike="noStrike">
-                        <a:latin typeface="Arial"/>
-                      </a:endParaRPr>
-                    </a:p>
-                  </a:txBody>
-                  <a:tcPr marL="82080" marR="82080">
-                    <a:lnL w="28080">
-                      <a:solidFill>
-                        <a:srgbClr val="000000"/>
-                      </a:solidFill>
-                    </a:lnL>
-                    <a:lnR w="28080">
-                      <a:solidFill>
-                        <a:srgbClr val="000000"/>
-                      </a:solidFill>
-                    </a:lnR>
-                    <a:lnT w="28080">
-                      <a:solidFill>
-                        <a:srgbClr val="000000"/>
-                      </a:solidFill>
-                    </a:lnT>
-                    <a:lnB w="28080">
-                      <a:solidFill>
-                        <a:srgbClr val="000000"/>
-                      </a:solidFill>
-                    </a:lnB>
-                    <a:noFill/>
-                  </a:tcPr>
-                </a:tc>
-                <a:tc vMerge="1" gridSpan="1">
-                  <a:tcPr>
-                    <a:solidFill>
-                      <a:srgbClr val="729fcf"/>
-                    </a:solidFill>
-                  </a:tcPr>
-                </a:tc>
-                <a:tc vMerge="1" hMerge="1">
-                  <a:tcPr>
-                    <a:solidFill>
-                      <a:srgbClr val="729fcf"/>
-                    </a:solidFill>
-                  </a:tcPr>
-                </a:tc>
-                <a:tc>
-                  <a:txBody>
-                    <a:bodyPr lIns="82080" rIns="82080"/>
-                    <a:p>
-                      <a:pPr>
-                        <a:lnSpc>
-                          <a:spcPct val="100000"/>
-                        </a:lnSpc>
-                      </a:pPr>
-                      <a:r>
-                        <a:rPr b="1" lang="es-ES" sz="1200" spc="-1" strike="noStrike">
-                          <a:solidFill>
-                            <a:srgbClr val="000000"/>
-                          </a:solidFill>
-                          <a:latin typeface="Calibri"/>
-                        </a:rPr>
-                        <a:t>             </a:t>
-                      </a:r>
-                      <a:r>
-                        <a:rPr b="1" lang="es-ES" sz="1200" spc="-1" strike="noStrike">
-                          <a:solidFill>
-                            <a:srgbClr val="000000"/>
-                          </a:solidFill>
-                          <a:latin typeface="Calibri"/>
-                        </a:rPr>
-                        <a:t>Channels</a:t>
-                      </a:r>
-                      <a:endParaRPr b="0" lang="es-ES" sz="1200" spc="-1" strike="noStrike">
-                        <a:latin typeface="Arial"/>
-                      </a:endParaRPr>
-                    </a:p>
-                    <a:p>
-                      <a:pPr>
-                        <a:lnSpc>
-                          <a:spcPct val="100000"/>
-                        </a:lnSpc>
-                      </a:pPr>
-                      <a:endParaRPr b="0" lang="es-ES" sz="1200" spc="-1" strike="noStrike">
-                        <a:latin typeface="Arial"/>
-                      </a:endParaRPr>
-                    </a:p>
-                    <a:p>
-                      <a:pPr>
-                        <a:lnSpc>
-                          <a:spcPct val="100000"/>
-                        </a:lnSpc>
-                      </a:pPr>
-                      <a:endParaRPr b="0" lang="es-ES" sz="1200" spc="-1" strike="noStrike">
-                        <a:latin typeface="Arial"/>
-                      </a:endParaRPr>
-                    </a:p>
-                    <a:p>
-                      <a:pPr>
-                        <a:lnSpc>
-                          <a:spcPct val="100000"/>
-                        </a:lnSpc>
-                      </a:pPr>
-                      <a:endParaRPr b="0" lang="es-ES" sz="1200" spc="-1" strike="noStrike">
-                        <a:latin typeface="Arial"/>
-                      </a:endParaRPr>
-                    </a:p>
-                  </a:txBody>
-                  <a:tcPr marL="82080" marR="82080">
-                    <a:lnL w="28080">
-                      <a:solidFill>
-                        <a:srgbClr val="000000"/>
-                      </a:solidFill>
-                    </a:lnL>
-                    <a:lnR w="28080">
-                      <a:solidFill>
-                        <a:srgbClr val="000000"/>
-                      </a:solidFill>
-                    </a:lnR>
-                    <a:lnT w="28080">
-                      <a:solidFill>
-                        <a:srgbClr val="000000"/>
-                      </a:solidFill>
-                    </a:lnT>
-                    <a:lnB w="28080">
-                      <a:solidFill>
-                        <a:srgbClr val="000000"/>
-                      </a:solidFill>
-                    </a:lnB>
-                    <a:noFill/>
-                  </a:tcPr>
-                </a:tc>
-                <a:tc vMerge="1">
-                  <a:tcPr>
-                    <a:solidFill>
-                      <a:srgbClr val="729fcf"/>
-                    </a:solidFill>
-                  </a:tcPr>
-                </a:tc>
-              </a:tr>
-              <a:tr h="956520">
-                <a:tc gridSpan="3">
-                  <a:txBody>
-                    <a:bodyPr lIns="82080" rIns="82080"/>
-                    <a:p>
-                      <a:pPr>
-                        <a:lnSpc>
-                          <a:spcPct val="100000"/>
-                        </a:lnSpc>
-                      </a:pPr>
-                      <a:r>
-                        <a:rPr b="1" lang="es-ES" sz="1200" spc="-1" strike="noStrike">
-                          <a:solidFill>
-                            <a:srgbClr val="000000"/>
-                          </a:solidFill>
-                          <a:latin typeface="Calibri"/>
-                        </a:rPr>
-                        <a:t>              </a:t>
-                      </a:r>
-                      <a:r>
-                        <a:rPr b="1" lang="es-ES" sz="1200" spc="-1" strike="noStrike">
-                          <a:solidFill>
-                            <a:srgbClr val="000000"/>
-                          </a:solidFill>
-                          <a:latin typeface="Calibri"/>
-                        </a:rPr>
-                        <a:t>Cost Structure</a:t>
-                      </a:r>
-                      <a:endParaRPr b="0" lang="es-ES" sz="1200" spc="-1" strike="noStrike">
-                        <a:latin typeface="Arial"/>
-                      </a:endParaRPr>
-                    </a:p>
-                    <a:p>
-                      <a:pPr>
-                        <a:lnSpc>
-                          <a:spcPct val="100000"/>
-                        </a:lnSpc>
-                      </a:pPr>
-                      <a:endParaRPr b="0" lang="es-ES" sz="1200" spc="-1" strike="noStrike">
-                        <a:latin typeface="Arial"/>
-                      </a:endParaRPr>
-                    </a:p>
-                    <a:p>
-                      <a:pPr>
-                        <a:lnSpc>
-                          <a:spcPct val="100000"/>
-                        </a:lnSpc>
-                      </a:pPr>
-                      <a:endParaRPr b="0" lang="es-ES" sz="1200" spc="-1" strike="noStrike">
-                        <a:latin typeface="Arial"/>
-                      </a:endParaRPr>
-                    </a:p>
-                    <a:p>
-                      <a:pPr>
-                        <a:lnSpc>
-                          <a:spcPct val="100000"/>
-                        </a:lnSpc>
-                      </a:pPr>
-                      <a:endParaRPr b="0" lang="es-ES" sz="1200" spc="-1" strike="noStrike">
-                        <a:latin typeface="Arial"/>
-                      </a:endParaRPr>
-                    </a:p>
-                  </a:txBody>
-                  <a:tcPr marL="82080" marR="82080">
-                    <a:lnL w="28080">
-                      <a:solidFill>
-                        <a:srgbClr val="000000"/>
-                      </a:solidFill>
-                    </a:lnL>
-                    <a:lnR w="28080">
-                      <a:solidFill>
-                        <a:srgbClr val="000000"/>
-                      </a:solidFill>
-                    </a:lnR>
-                    <a:lnT w="28080">
-                      <a:solidFill>
-                        <a:srgbClr val="000000"/>
-                      </a:solidFill>
-                    </a:lnT>
-                    <a:lnB w="28080">
-                      <a:solidFill>
-                        <a:srgbClr val="000000"/>
-                      </a:solidFill>
-                    </a:lnB>
-                    <a:noFill/>
-                  </a:tcPr>
-                </a:tc>
-                <a:tc hMerge="1">
-                  <a:tcPr>
-                    <a:solidFill>
-                      <a:srgbClr val="729fcf"/>
-                    </a:solidFill>
-                  </a:tcPr>
-                </a:tc>
-                <a:tc hMerge="1">
-                  <a:tcPr>
-                    <a:solidFill>
-                      <a:srgbClr val="729fcf"/>
-                    </a:solidFill>
-                  </a:tcPr>
-                </a:tc>
-                <a:tc gridSpan="3">
-                  <a:txBody>
-                    <a:bodyPr lIns="82080" rIns="82080"/>
-                    <a:p>
-                      <a:pPr>
-                        <a:lnSpc>
-                          <a:spcPct val="100000"/>
-                        </a:lnSpc>
-                      </a:pPr>
-                      <a:r>
-                        <a:rPr b="1" lang="es-ES" sz="1200" spc="-1" strike="noStrike">
-                          <a:solidFill>
-                            <a:srgbClr val="000000"/>
-                          </a:solidFill>
-                          <a:latin typeface="Calibri"/>
-                        </a:rPr>
-                        <a:t>           </a:t>
-                      </a:r>
-                      <a:r>
-                        <a:rPr b="1" lang="es-ES" sz="1200" spc="-1" strike="noStrike">
-                          <a:solidFill>
-                            <a:srgbClr val="000000"/>
-                          </a:solidFill>
-                          <a:latin typeface="Calibri"/>
-                        </a:rPr>
-                        <a:t>Revenue Streams</a:t>
-                      </a:r>
-                      <a:endParaRPr b="0" lang="es-ES" sz="1200" spc="-1" strike="noStrike">
-                        <a:latin typeface="Arial"/>
-                      </a:endParaRPr>
-                    </a:p>
-                    <a:p>
-                      <a:pPr>
-                        <a:lnSpc>
-                          <a:spcPct val="100000"/>
-                        </a:lnSpc>
-                      </a:pPr>
-                      <a:endParaRPr b="0" lang="es-ES" sz="1200" spc="-1" strike="noStrike">
-                        <a:latin typeface="Arial"/>
-                      </a:endParaRPr>
-                    </a:p>
-                    <a:p>
-                      <a:pPr>
-                        <a:lnSpc>
-                          <a:spcPct val="100000"/>
-                        </a:lnSpc>
-                      </a:pPr>
-                      <a:endParaRPr b="0" lang="es-ES" sz="1200" spc="-1" strike="noStrike">
-                        <a:latin typeface="Arial"/>
-                      </a:endParaRPr>
-                    </a:p>
-                    <a:p>
-                      <a:pPr>
-                        <a:lnSpc>
-                          <a:spcPct val="100000"/>
-                        </a:lnSpc>
-                      </a:pPr>
-                      <a:endParaRPr b="0" lang="es-ES" sz="1200" spc="-1" strike="noStrike">
-                        <a:latin typeface="Arial"/>
-                      </a:endParaRPr>
-                    </a:p>
-                  </a:txBody>
-                  <a:tcPr marL="82080" marR="82080">
-                    <a:lnL w="28080">
-                      <a:solidFill>
-                        <a:srgbClr val="000000"/>
-                      </a:solidFill>
-                    </a:lnL>
-                    <a:lnR w="28080">
-                      <a:solidFill>
-                        <a:srgbClr val="000000"/>
-                      </a:solidFill>
-                    </a:lnR>
-                    <a:lnT w="28080">
-                      <a:solidFill>
-                        <a:srgbClr val="000000"/>
-                      </a:solidFill>
-                    </a:lnT>
-                    <a:lnB w="28080">
-                      <a:solidFill>
-                        <a:srgbClr val="000000"/>
-                      </a:solidFill>
-                    </a:lnB>
-                    <a:noFill/>
-                  </a:tcPr>
-                </a:tc>
-                <a:tc hMerge="1">
-                  <a:tcPr>
-                    <a:solidFill>
-                      <a:srgbClr val="729fcf"/>
-                    </a:solidFill>
-                  </a:tcPr>
-                </a:tc>
-                <a:tc hMerge="1">
-                  <a:tcPr>
-                    <a:solidFill>
-                      <a:srgbClr val="729fcf"/>
-                    </a:solidFill>
-                  </a:tcPr>
-                </a:tc>
-              </a:tr>
-              <a:tr h="428760">
-                <a:tc gridSpan="6">
-                  <a:tcPr marL="82080" marR="82080">
-                    <a:lnL w="28080">
-                      <a:noFill/>
-                    </a:lnL>
-                    <a:lnR w="28080">
-                      <a:noFill/>
-                    </a:lnR>
-                    <a:lnT w="28080">
-                      <a:solidFill>
-                        <a:srgbClr val="000000"/>
-                      </a:solidFill>
-                    </a:lnT>
-                    <a:lnB w="28080">
-                      <a:solidFill>
-                        <a:srgbClr val="000000"/>
-                      </a:solidFill>
-                    </a:lnB>
-                    <a:noFill/>
-                  </a:tcPr>
-                </a:tc>
-                <a:tc hMerge="1">
-                  <a:tcPr>
-                    <a:solidFill>
-                      <a:srgbClr val="729fcf"/>
-                    </a:solidFill>
-                  </a:tcPr>
-                </a:tc>
-                <a:tc hMerge="1">
-                  <a:tcPr>
-                    <a:solidFill>
-                      <a:srgbClr val="729fcf"/>
-                    </a:solidFill>
-                  </a:tcPr>
-                </a:tc>
-                <a:tc hMerge="1">
-                  <a:tcPr>
-                    <a:solidFill>
-                      <a:srgbClr val="729fcf"/>
-                    </a:solidFill>
-                  </a:tcPr>
-                </a:tc>
-                <a:tc hMerge="1">
-                  <a:tcPr>
-                    <a:solidFill>
-                      <a:srgbClr val="729fcf"/>
-                    </a:solidFill>
-                  </a:tcPr>
-                </a:tc>
-                <a:tc hMerge="1">
-                  <a:tcPr>
-                    <a:solidFill>
-                      <a:srgbClr val="729fcf"/>
-                    </a:solidFill>
-                  </a:tcPr>
-                </a:tc>
-              </a:tr>
-              <a:tr h="851760">
-                <a:tc gridSpan="3">
-                  <a:txBody>
-                    <a:bodyPr lIns="82080" rIns="82080"/>
-                    <a:p>
-                      <a:pPr>
-                        <a:lnSpc>
-                          <a:spcPct val="100000"/>
-                        </a:lnSpc>
-                      </a:pPr>
-                      <a:r>
-                        <a:rPr b="1" lang="es-ES" sz="1200" spc="-1" strike="noStrike">
-                          <a:solidFill>
-                            <a:srgbClr val="000000"/>
-                          </a:solidFill>
-                          <a:latin typeface="Calibri"/>
-                        </a:rPr>
-                        <a:t>       </a:t>
-                      </a:r>
-                      <a:r>
-                        <a:rPr b="1" lang="es-ES" sz="1200" spc="-1" strike="noStrike">
-                          <a:solidFill>
-                            <a:srgbClr val="000000"/>
-                          </a:solidFill>
-                          <a:latin typeface="Calibri"/>
-                        </a:rPr>
-                        <a:t>Social &amp; Environmental Cost</a:t>
-                      </a:r>
-                      <a:endParaRPr b="0" lang="es-ES" sz="1200" spc="-1" strike="noStrike">
-                        <a:latin typeface="Arial"/>
-                      </a:endParaRPr>
-                    </a:p>
-                    <a:p>
-                      <a:pPr>
-                        <a:lnSpc>
-                          <a:spcPct val="100000"/>
-                        </a:lnSpc>
-                      </a:pPr>
-                      <a:r>
-                        <a:rPr b="0" lang="es-ES" sz="1100" spc="-1" strike="noStrike">
-                          <a:solidFill>
-                            <a:srgbClr val="000000"/>
-                          </a:solidFill>
-                          <a:latin typeface="Comic Sans MS"/>
-                        </a:rPr>
-                        <a:t>          </a:t>
-                      </a:r>
-                      <a:endParaRPr b="0" lang="es-ES" sz="1100" spc="-1" strike="noStrike">
-                        <a:latin typeface="Arial"/>
-                      </a:endParaRPr>
-                    </a:p>
-                  </a:txBody>
-                  <a:tcPr marL="82080" marR="82080">
-                    <a:lnL w="28080">
-                      <a:solidFill>
-                        <a:srgbClr val="000000"/>
-                      </a:solidFill>
-                    </a:lnL>
-                    <a:lnR w="28080">
-                      <a:solidFill>
-                        <a:srgbClr val="000000"/>
-                      </a:solidFill>
-                    </a:lnR>
-                    <a:lnT w="28080">
-                      <a:solidFill>
-                        <a:srgbClr val="000000"/>
-                      </a:solidFill>
-                    </a:lnT>
-                    <a:lnB w="28080">
-                      <a:solidFill>
-                        <a:srgbClr val="000000"/>
-                      </a:solidFill>
-                    </a:lnB>
-                    <a:solidFill>
-                      <a:srgbClr val="ff0000">
-                        <a:alpha val="40000"/>
-                      </a:srgbClr>
-                    </a:solidFill>
-                  </a:tcPr>
-                </a:tc>
-                <a:tc hMerge="1">
-                  <a:tcPr>
-                    <a:solidFill>
-                      <a:srgbClr val="729fcf"/>
-                    </a:solidFill>
-                  </a:tcPr>
-                </a:tc>
-                <a:tc hMerge="1">
-                  <a:tcPr>
-                    <a:solidFill>
-                      <a:srgbClr val="729fcf"/>
-                    </a:solidFill>
-                  </a:tcPr>
-                </a:tc>
-                <a:tc gridSpan="3">
-                  <a:txBody>
-                    <a:bodyPr lIns="82080" rIns="82080"/>
-                    <a:p>
-                      <a:pPr>
-                        <a:lnSpc>
-                          <a:spcPct val="100000"/>
-                        </a:lnSpc>
-                      </a:pPr>
-                      <a:r>
-                        <a:rPr b="1" lang="es-ES" sz="1200" spc="-1" strike="noStrike">
-                          <a:solidFill>
-                            <a:srgbClr val="000000"/>
-                          </a:solidFill>
-                          <a:latin typeface="Calibri"/>
-                        </a:rPr>
-                        <a:t>            </a:t>
-                      </a:r>
-                      <a:r>
-                        <a:rPr b="1" lang="es-ES" sz="1200" spc="-1" strike="noStrike">
-                          <a:solidFill>
-                            <a:srgbClr val="000000"/>
-                          </a:solidFill>
-                          <a:latin typeface="Calibri"/>
-                        </a:rPr>
-                        <a:t>Social &amp; Environmental Benefit</a:t>
-                      </a:r>
-                      <a:endParaRPr b="0" lang="es-ES" sz="1200" spc="-1" strike="noStrike">
-                        <a:latin typeface="Arial"/>
-                      </a:endParaRPr>
-                    </a:p>
-                    <a:p>
-                      <a:pPr>
-                        <a:lnSpc>
-                          <a:spcPct val="100000"/>
-                        </a:lnSpc>
-                      </a:pPr>
-                      <a:r>
-                        <a:rPr b="0" lang="es-ES" sz="1100" spc="-1" strike="noStrike">
-                          <a:solidFill>
-                            <a:srgbClr val="000000"/>
-                          </a:solidFill>
-                          <a:latin typeface="Comic Sans MS"/>
-                        </a:rPr>
-                        <a:t>          </a:t>
-                      </a:r>
-                      <a:endParaRPr b="0" lang="es-ES" sz="1100" spc="-1" strike="noStrike">
-                        <a:latin typeface="Arial"/>
-                      </a:endParaRPr>
-                    </a:p>
-                  </a:txBody>
-                  <a:tcPr marL="82080" marR="82080">
-                    <a:lnL w="28080">
-                      <a:solidFill>
-                        <a:srgbClr val="000000"/>
-                      </a:solidFill>
-                    </a:lnL>
-                    <a:lnR w="28080">
-                      <a:solidFill>
-                        <a:srgbClr val="000000"/>
-                      </a:solidFill>
-                    </a:lnR>
-                    <a:lnT w="28080">
-                      <a:solidFill>
-                        <a:srgbClr val="000000"/>
-                      </a:solidFill>
-                    </a:lnT>
-                    <a:lnB w="28080">
-                      <a:solidFill>
-                        <a:srgbClr val="000000"/>
-                      </a:solidFill>
-                    </a:lnB>
-                    <a:solidFill>
-                      <a:srgbClr val="92d050">
-                        <a:alpha val="40000"/>
-                      </a:srgbClr>
-                    </a:solidFill>
-                  </a:tcPr>
-                </a:tc>
-                <a:tc hMerge="1">
-                  <a:tcPr>
-                    <a:solidFill>
-                      <a:srgbClr val="729fcf"/>
-                    </a:solidFill>
-                  </a:tcPr>
-                </a:tc>
-                <a:tc hMerge="1">
-                  <a:tcPr>
-                    <a:solidFill>
-                      <a:srgbClr val="729fcf"/>
-                    </a:solidFill>
-                  </a:tcPr>
-                </a:tc>
-              </a:tr>
-              <a:tr h="239760">
-                <a:tc gridSpan="6">
-                  <a:txBody>
-                    <a:bodyPr lIns="82080" rIns="82080"/>
-                    <a:p>
-                      <a:pPr algn="r">
-                        <a:lnSpc>
-                          <a:spcPct val="100000"/>
-                        </a:lnSpc>
-                      </a:pPr>
-                      <a:r>
-                        <a:rPr b="0" lang="es-ES" sz="1000" spc="-1" strike="noStrike" u="sng">
-                          <a:solidFill>
-                            <a:srgbClr val="0000ff"/>
-                          </a:solidFill>
-                          <a:uFillTx/>
-                          <a:latin typeface="Calibri"/>
-                          <a:hlinkClick r:id="rId12"/>
-                        </a:rPr>
-                        <a:t>http://www.businessmodelgeneration.com</a:t>
-                      </a:r>
-                      <a:endParaRPr b="0" lang="es-ES" sz="1000" spc="-1" strike="noStrike">
-                        <a:latin typeface="Arial"/>
-                      </a:endParaRPr>
-                    </a:p>
-                  </a:txBody>
-                  <a:tcPr marL="82080" marR="82080">
-                    <a:lnL w="12240">
-                      <a:noFill/>
-                    </a:lnL>
-                    <a:lnR w="12240">
-                      <a:noFill/>
-                    </a:lnR>
-                    <a:lnT w="28080">
-                      <a:solidFill>
-                        <a:srgbClr val="000000"/>
-                      </a:solidFill>
-                    </a:lnT>
-                    <a:lnB w="12240">
-                      <a:noFill/>
-                    </a:lnB>
-                    <a:noFill/>
-                  </a:tcPr>
-                </a:tc>
-                <a:tc hMerge="1">
-                  <a:tcPr>
-                    <a:solidFill>
-                      <a:srgbClr val="729fcf"/>
-                    </a:solidFill>
-                  </a:tcPr>
-                </a:tc>
-                <a:tc hMerge="1">
-                  <a:tcPr>
-                    <a:solidFill>
-                      <a:srgbClr val="729fcf"/>
-                    </a:solidFill>
-                  </a:tcPr>
-                </a:tc>
-                <a:tc hMerge="1">
-                  <a:tcPr>
-                    <a:solidFill>
-                      <a:srgbClr val="729fcf"/>
-                    </a:solidFill>
-                  </a:tcPr>
-                </a:tc>
-                <a:tc hMerge="1">
-                  <a:tcPr>
-                    <a:solidFill>
-                      <a:srgbClr val="729fcf"/>
-                    </a:solidFill>
-                  </a:tcPr>
-                </a:tc>
-                <a:tc hMerge="1">
-                  <a:tcPr>
-                    <a:solidFill>
-                      <a:srgbClr val="729fcf"/>
-                    </a:solidFill>
-                  </a:tcPr>
-                </a:tc>
-              </a:tr>
-            </a:tbl>
-          </a:graphicData>
-        </a:graphic>
-      </p:graphicFrame>
-      <p:grpSp>
-        <p:nvGrpSpPr>
-          <p:cNvPr id="64" name="Group 3"/>
-          <p:cNvGrpSpPr/>
-          <p:nvPr/>
-        </p:nvGrpSpPr>
-        <p:grpSpPr>
-          <a:xfrm>
-            <a:off x="3809880" y="1828800"/>
-            <a:ext cx="1507680" cy="1074240"/>
-            <a:chOff x="3809880" y="1828800"/>
-            <a:chExt cx="1507680" cy="1074240"/>
-          </a:xfrm>
-        </p:grpSpPr>
-        <p:pic>
-          <p:nvPicPr>
-            <p:cNvPr id="65" name="Picture 43" descr=""/>
-            <p:cNvPicPr/>
-            <p:nvPr/>
-          </p:nvPicPr>
-          <p:blipFill>
-            <a:blip r:embed="rId13"/>
-            <a:stretch/>
-          </p:blipFill>
-          <p:spPr>
-            <a:xfrm>
-              <a:off x="3809880" y="1828800"/>
-              <a:ext cx="1507680" cy="1074240"/>
-            </a:xfrm>
-            <a:prstGeom prst="rect">
-              <a:avLst/>
-            </a:prstGeom>
-            <a:ln w="9360">
-              <a:noFill/>
-            </a:ln>
-          </p:spPr>
-        </p:pic>
-        <p:sp>
-          <p:nvSpPr>
-            <p:cNvPr id="66" name="CustomShape 4"/>
-            <p:cNvSpPr/>
-            <p:nvPr/>
-          </p:nvSpPr>
-          <p:spPr>
-            <a:xfrm rot="21423600">
-              <a:off x="3838320" y="1865160"/>
-              <a:ext cx="1447560" cy="990360"/>
-            </a:xfrm>
-            <a:prstGeom prst="rect">
-              <a:avLst/>
-            </a:prstGeom>
-            <a:noFill/>
-            <a:ln>
-              <a:noFill/>
-            </a:ln>
-          </p:spPr>
-          <p:style>
-            <a:lnRef idx="0"/>
-            <a:fillRef idx="0"/>
-            <a:effectRef idx="0"/>
-            <a:fontRef idx="minor"/>
-          </p:style>
-          <p:txBody>
-            <a:bodyPr lIns="90000" rIns="90000" tIns="45000" bIns="45000">
-              <a:normAutofit/>
-            </a:bodyPr>
-            <a:p>
-              <a:pPr>
-                <a:lnSpc>
-                  <a:spcPct val="100000"/>
-                </a:lnSpc>
-              </a:pPr>
-              <a:r>
-                <a:rPr b="1" lang="es-ES" sz="1400" spc="-1" strike="noStrike">
-                  <a:solidFill>
-                    <a:srgbClr val="000000"/>
-                  </a:solidFill>
-                  <a:latin typeface="Bradley Hand ITC"/>
-                </a:rPr>
-                <a:t>Double click on the post-it to edit. Recolour it using the picture format tools.</a:t>
-              </a:r>
-              <a:endParaRPr b="0" lang="es-ES" sz="1400" spc="-1" strike="noStrike">
-                <a:latin typeface="Arial"/>
-              </a:endParaRPr>
-            </a:p>
-          </p:txBody>
-        </p:sp>
-      </p:grpSp>
-    </p:spTree>
-  </p:cSld>
-  <p:timing>
-    <p:tnLst>
-      <p:par>
-        <p:cTn id="3" dur="indefinite" restart="never" nodeType="tmRoot">
-          <p:childTnLst>
-            <p:seq>
-              <p:cTn id="4" dur="indefinite" nodeType="mainSeq"/>
               <p:prevCondLst>
                 <p:cond delay="0" evt="onPrev">
                   <p:tgtEl>

</xml_diff>